<commit_message>
Add test + update ppt
</commit_message>
<xml_diff>
--- a/Presentations/Second Intermediate Presentation/Presentation.pptx
+++ b/Presentations/Second Intermediate Presentation/Presentation.pptx
@@ -6,10 +6,10 @@
     <p:sldMasterId id="2147483694" r:id="rId2"/>
   </p:sldMasterIdLst>
   <p:notesMasterIdLst>
-    <p:notesMasterId r:id="rId13"/>
+    <p:notesMasterId r:id="rId19"/>
   </p:notesMasterIdLst>
   <p:handoutMasterIdLst>
-    <p:handoutMasterId r:id="rId14"/>
+    <p:handoutMasterId r:id="rId20"/>
   </p:handoutMasterIdLst>
   <p:sldIdLst>
     <p:sldId id="261" r:id="rId3"/>
@@ -20,8 +20,14 @@
     <p:sldId id="264" r:id="rId8"/>
     <p:sldId id="270" r:id="rId9"/>
     <p:sldId id="271" r:id="rId10"/>
-    <p:sldId id="265" r:id="rId11"/>
-    <p:sldId id="266" r:id="rId12"/>
+    <p:sldId id="272" r:id="rId11"/>
+    <p:sldId id="273" r:id="rId12"/>
+    <p:sldId id="275" r:id="rId13"/>
+    <p:sldId id="274" r:id="rId14"/>
+    <p:sldId id="276" r:id="rId15"/>
+    <p:sldId id="277" r:id="rId16"/>
+    <p:sldId id="265" r:id="rId17"/>
+    <p:sldId id="266" r:id="rId18"/>
   </p:sldIdLst>
   <p:sldSz cx="12192000" cy="6858000"/>
   <p:notesSz cx="6858000" cy="9144000"/>
@@ -5129,6 +5135,2683 @@
       </p:grpSpPr>
       <p:sp>
         <p:nvSpPr>
+          <p:cNvPr id="2" name="Tijdelijke aanduiding voor inhoud 1">
+            <a:extLst>
+              <a:ext uri="{FF2B5EF4-FFF2-40B4-BE49-F238E27FC236}">
+                <a16:creationId xmlns:a16="http://schemas.microsoft.com/office/drawing/2014/main" id="{5D957F36-45E6-9225-91FC-50E3511DB37C}"/>
+              </a:ext>
+            </a:extLst>
+          </p:cNvPr>
+          <p:cNvSpPr>
+            <a:spLocks noGrp="1"/>
+          </p:cNvSpPr>
+          <p:nvPr>
+            <p:ph idx="1"/>
+          </p:nvPr>
+        </p:nvSpPr>
+        <p:spPr/>
+        <p:txBody>
+          <a:bodyPr/>
+          <a:lstStyle/>
+          <a:p>
+            <a:r>
+              <a:rPr lang="nl-NL" dirty="0"/>
+              <a:t>Lijn per lijn generen</a:t>
+            </a:r>
+          </a:p>
+          <a:p>
+            <a:r>
+              <a:rPr lang="nl-NL" dirty="0"/>
+              <a:t>Prompt:</a:t>
+            </a:r>
+          </a:p>
+          <a:p>
+            <a:pPr lvl="1"/>
+            <a:r>
+              <a:rPr lang="nl-NL" dirty="0"/>
+              <a:t>Context + nieuw onderwerp + al gegenereerde parodie + de volgende lijn</a:t>
+            </a:r>
+          </a:p>
+          <a:p>
+            <a:r>
+              <a:rPr lang="nl-NL" dirty="0" err="1"/>
+              <a:t>Constraint</a:t>
+            </a:r>
+            <a:r>
+              <a:rPr lang="nl-NL" dirty="0"/>
+              <a:t>:</a:t>
+            </a:r>
+          </a:p>
+          <a:p>
+            <a:pPr lvl="1"/>
+            <a:r>
+              <a:rPr lang="nl-NL" dirty="0" err="1"/>
+              <a:t>Logits</a:t>
+            </a:r>
+            <a:r>
+              <a:rPr lang="nl-NL" dirty="0"/>
+              <a:t> worden niet aangepast</a:t>
+            </a:r>
+          </a:p>
+          <a:p>
+            <a:pPr lvl="1"/>
+            <a:r>
+              <a:rPr lang="nl-NL" dirty="0"/>
+              <a:t>Beam score aangepast:</a:t>
+            </a:r>
+          </a:p>
+          <a:p>
+            <a:pPr lvl="2"/>
+            <a:r>
+              <a:rPr lang="nl-NL" dirty="0"/>
+              <a:t># lettergrepen van de </a:t>
+            </a:r>
+            <a:r>
+              <a:rPr lang="nl-NL" dirty="0" err="1"/>
+              <a:t>beam</a:t>
+            </a:r>
+            <a:r>
+              <a:rPr lang="nl-NL" dirty="0"/>
+              <a:t> == het gevraagde </a:t>
+            </a:r>
+            <a:r>
+              <a:rPr lang="nl-NL" dirty="0">
+                <a:sym typeface="Wingdings" pitchFamily="2" charset="2"/>
+              </a:rPr>
+              <a:t> score/10</a:t>
+            </a:r>
+          </a:p>
+          <a:p>
+            <a:pPr lvl="2"/>
+            <a:r>
+              <a:rPr lang="nl-NL" dirty="0">
+                <a:sym typeface="Wingdings" pitchFamily="2" charset="2"/>
+              </a:rPr>
+              <a:t># lettergrepen van de </a:t>
+            </a:r>
+            <a:r>
+              <a:rPr lang="nl-NL" dirty="0" err="1">
+                <a:sym typeface="Wingdings" pitchFamily="2" charset="2"/>
+              </a:rPr>
+              <a:t>beam</a:t>
+            </a:r>
+            <a:r>
+              <a:rPr lang="nl-NL" dirty="0">
+                <a:sym typeface="Wingdings" pitchFamily="2" charset="2"/>
+              </a:rPr>
+              <a:t> &gt; het gevraagde  score*10</a:t>
+            </a:r>
+          </a:p>
+          <a:p>
+            <a:pPr lvl="1"/>
+            <a:r>
+              <a:rPr lang="nl-NL" dirty="0">
+                <a:sym typeface="Wingdings" pitchFamily="2" charset="2"/>
+              </a:rPr>
+              <a:t>Generatie stopt als één van de </a:t>
+            </a:r>
+            <a:r>
+              <a:rPr lang="nl-NL" dirty="0" err="1">
+                <a:sym typeface="Wingdings" pitchFamily="2" charset="2"/>
+              </a:rPr>
+              <a:t>beams</a:t>
+            </a:r>
+            <a:r>
+              <a:rPr lang="nl-NL" dirty="0">
+                <a:sym typeface="Wingdings" pitchFamily="2" charset="2"/>
+              </a:rPr>
+              <a:t> het gevraagde # lettergrepen heeft</a:t>
+            </a:r>
+            <a:endParaRPr lang="nl-NL" dirty="0"/>
+          </a:p>
+          <a:p>
+            <a:pPr lvl="1"/>
+            <a:endParaRPr lang="nl-NL" dirty="0"/>
+          </a:p>
+          <a:p>
+            <a:endParaRPr lang="nl-NL" dirty="0"/>
+          </a:p>
+        </p:txBody>
+      </p:sp>
+      <p:sp>
+        <p:nvSpPr>
+          <p:cNvPr id="3" name="Tijdelijke aanduiding voor voettekst 2">
+            <a:extLst>
+              <a:ext uri="{FF2B5EF4-FFF2-40B4-BE49-F238E27FC236}">
+                <a16:creationId xmlns:a16="http://schemas.microsoft.com/office/drawing/2014/main" id="{622AE155-BA44-632D-7929-B935A78B28FE}"/>
+              </a:ext>
+            </a:extLst>
+          </p:cNvPr>
+          <p:cNvSpPr>
+            <a:spLocks noGrp="1"/>
+          </p:cNvSpPr>
+          <p:nvPr>
+            <p:ph type="ftr" sz="quarter" idx="11"/>
+          </p:nvPr>
+        </p:nvSpPr>
+        <p:spPr/>
+        <p:txBody>
+          <a:bodyPr/>
+          <a:lstStyle/>
+          <a:p>
+            <a:r>
+              <a:rPr lang="nl-NL"/>
+              <a:t>Computerwetenschappen - DTAI</a:t>
+            </a:r>
+            <a:endParaRPr lang="nl-NL" dirty="0"/>
+          </a:p>
+        </p:txBody>
+      </p:sp>
+      <p:sp>
+        <p:nvSpPr>
+          <p:cNvPr id="4" name="Tijdelijke aanduiding voor dianummer 3">
+            <a:extLst>
+              <a:ext uri="{FF2B5EF4-FFF2-40B4-BE49-F238E27FC236}">
+                <a16:creationId xmlns:a16="http://schemas.microsoft.com/office/drawing/2014/main" id="{C9E4B0DC-9E9A-589C-0F49-7E62AD83B3D9}"/>
+              </a:ext>
+            </a:extLst>
+          </p:cNvPr>
+          <p:cNvSpPr>
+            <a:spLocks noGrp="1"/>
+          </p:cNvSpPr>
+          <p:nvPr>
+            <p:ph type="sldNum" sz="quarter" idx="12"/>
+          </p:nvPr>
+        </p:nvSpPr>
+        <p:spPr/>
+        <p:txBody>
+          <a:bodyPr/>
+          <a:lstStyle/>
+          <a:p>
+            <a:fld id="{0A297500-7527-634B-90F4-69D0994C32B4}" type="slidenum">
+              <a:rPr lang="nl-NL" smtClean="0"/>
+              <a:t>10</a:t>
+            </a:fld>
+            <a:endParaRPr lang="nl-NL" dirty="0"/>
+          </a:p>
+        </p:txBody>
+      </p:sp>
+      <p:sp>
+        <p:nvSpPr>
+          <p:cNvPr id="5" name="Titel 4">
+            <a:extLst>
+              <a:ext uri="{FF2B5EF4-FFF2-40B4-BE49-F238E27FC236}">
+                <a16:creationId xmlns:a16="http://schemas.microsoft.com/office/drawing/2014/main" id="{C59A1A93-DA15-6CCA-3099-EA5C0AE16C6B}"/>
+              </a:ext>
+            </a:extLst>
+          </p:cNvPr>
+          <p:cNvSpPr>
+            <a:spLocks noGrp="1"/>
+          </p:cNvSpPr>
+          <p:nvPr>
+            <p:ph type="title"/>
+          </p:nvPr>
+        </p:nvSpPr>
+        <p:spPr/>
+        <p:txBody>
+          <a:bodyPr>
+            <a:normAutofit fontScale="90000"/>
+          </a:bodyPr>
+          <a:lstStyle/>
+          <a:p>
+            <a:r>
+              <a:rPr lang="nl-NL" b="1" dirty="0"/>
+              <a:t>Huidig onderzoek: </a:t>
+            </a:r>
+            <a:r>
+              <a:rPr lang="nl-NL" dirty="0" err="1"/>
+              <a:t>Syllable</a:t>
+            </a:r>
+            <a:r>
+              <a:rPr lang="nl-NL" dirty="0"/>
+              <a:t> </a:t>
+            </a:r>
+            <a:r>
+              <a:rPr lang="nl-NL" dirty="0" err="1"/>
+              <a:t>Constraint</a:t>
+            </a:r>
+            <a:r>
+              <a:rPr lang="nl-NL" dirty="0"/>
+              <a:t> | Oplossing 1</a:t>
+            </a:r>
+            <a:endParaRPr lang="en-US" dirty="0"/>
+          </a:p>
+        </p:txBody>
+      </p:sp>
+    </p:spTree>
+    <p:extLst>
+      <p:ext uri="{BB962C8B-B14F-4D97-AF65-F5344CB8AC3E}">
+        <p14:creationId xmlns:p14="http://schemas.microsoft.com/office/powerpoint/2010/main" val="4246468099"/>
+      </p:ext>
+    </p:extLst>
+  </p:cSld>
+  <p:clrMapOvr>
+    <a:masterClrMapping/>
+  </p:clrMapOvr>
+</p:sld>
+</file>
+
+<file path=ppt/slides/slide11.xml><?xml version="1.0" encoding="utf-8"?>
+<p:sld xmlns:a="http://schemas.openxmlformats.org/drawingml/2006/main" xmlns:r="http://schemas.openxmlformats.org/officeDocument/2006/relationships" xmlns:p="http://schemas.openxmlformats.org/presentationml/2006/main">
+  <p:cSld>
+    <p:spTree>
+      <p:nvGrpSpPr>
+        <p:cNvPr id="1" name=""/>
+        <p:cNvGrpSpPr/>
+        <p:nvPr/>
+      </p:nvGrpSpPr>
+      <p:grpSpPr>
+        <a:xfrm>
+          <a:off x="0" y="0"/>
+          <a:ext cx="0" cy="0"/>
+          <a:chOff x="0" y="0"/>
+          <a:chExt cx="0" cy="0"/>
+        </a:xfrm>
+      </p:grpSpPr>
+      <p:sp>
+        <p:nvSpPr>
+          <p:cNvPr id="2" name="Tijdelijke aanduiding voor tekst 1">
+            <a:extLst>
+              <a:ext uri="{FF2B5EF4-FFF2-40B4-BE49-F238E27FC236}">
+                <a16:creationId xmlns:a16="http://schemas.microsoft.com/office/drawing/2014/main" id="{826263D6-814D-E57A-AB89-B2ABCA69F3C1}"/>
+              </a:ext>
+            </a:extLst>
+          </p:cNvPr>
+          <p:cNvSpPr>
+            <a:spLocks noGrp="1"/>
+          </p:cNvSpPr>
+          <p:nvPr>
+            <p:ph type="body" idx="1"/>
+          </p:nvPr>
+        </p:nvSpPr>
+        <p:spPr/>
+        <p:txBody>
+          <a:bodyPr/>
+          <a:lstStyle/>
+          <a:p>
+            <a:r>
+              <a:rPr lang="en-US" dirty="0" err="1"/>
+              <a:t>Origineel</a:t>
+            </a:r>
+            <a:endParaRPr lang="en-US" dirty="0"/>
+          </a:p>
+        </p:txBody>
+      </p:sp>
+      <p:sp>
+        <p:nvSpPr>
+          <p:cNvPr id="3" name="Tijdelijke aanduiding voor inhoud 2">
+            <a:extLst>
+              <a:ext uri="{FF2B5EF4-FFF2-40B4-BE49-F238E27FC236}">
+                <a16:creationId xmlns:a16="http://schemas.microsoft.com/office/drawing/2014/main" id="{4B5594B7-B2F6-ECDD-D41B-2D5DAC365C51}"/>
+              </a:ext>
+            </a:extLst>
+          </p:cNvPr>
+          <p:cNvSpPr>
+            <a:spLocks noGrp="1"/>
+          </p:cNvSpPr>
+          <p:nvPr>
+            <p:ph sz="half" idx="2"/>
+          </p:nvPr>
+        </p:nvSpPr>
+        <p:spPr>
+          <a:solidFill>
+            <a:schemeClr val="tx2">
+              <a:lumMod val="20000"/>
+              <a:lumOff val="80000"/>
+            </a:schemeClr>
+          </a:solidFill>
+          <a:ln w="9525">
+            <a:solidFill>
+              <a:schemeClr val="accent1"/>
+            </a:solidFill>
+          </a:ln>
+        </p:spPr>
+        <p:txBody>
+          <a:bodyPr>
+            <a:normAutofit fontScale="55000" lnSpcReduction="20000"/>
+          </a:bodyPr>
+          <a:lstStyle/>
+          <a:p>
+            <a:pPr marL="0" indent="0">
+              <a:lnSpc>
+                <a:spcPct val="120000"/>
+              </a:lnSpc>
+              <a:buNone/>
+            </a:pPr>
+            <a:r>
+              <a:rPr lang="en-US" dirty="0"/>
+              <a:t>…</a:t>
+            </a:r>
+            <a:br>
+              <a:rPr lang="en-US" dirty="0"/>
+            </a:br>
+            <a:r>
+              <a:rPr lang="en-US" dirty="0"/>
+              <a:t>[Post-Chorus]</a:t>
+            </a:r>
+            <a:br>
+              <a:rPr lang="en-US" dirty="0"/>
+            </a:br>
+            <a:r>
+              <a:rPr lang="en-US" dirty="0"/>
+              <a:t>Uh-huh</a:t>
+            </a:r>
+            <a:br>
+              <a:rPr lang="en-US" dirty="0"/>
+            </a:br>
+            <a:r>
+              <a:rPr lang="en-US" dirty="0"/>
+              <a:t>(Is it? Is it? Is it?)</a:t>
+            </a:r>
+            <a:br>
+              <a:rPr lang="en-US" dirty="0"/>
+            </a:br>
+            <a:r>
+              <a:rPr lang="en-US" dirty="0"/>
+              <a:t>Uh-huh</a:t>
+            </a:r>
+            <a:br>
+              <a:rPr lang="en-US" dirty="0"/>
+            </a:br>
+            <a:r>
+              <a:rPr lang="en-US" dirty="0"/>
+              <a:t>(Is it? Is it?)</a:t>
+            </a:r>
+          </a:p>
+          <a:p>
+            <a:pPr marL="0" indent="0">
+              <a:lnSpc>
+                <a:spcPct val="120000"/>
+              </a:lnSpc>
+              <a:buNone/>
+            </a:pPr>
+            <a:r>
+              <a:rPr lang="en-US" dirty="0"/>
+              <a:t>[Bridge]</a:t>
+            </a:r>
+            <a:br>
+              <a:rPr lang="en-US" dirty="0"/>
+            </a:br>
+            <a:r>
+              <a:rPr lang="en-US" dirty="0"/>
+              <a:t>Think I didn't see you?</a:t>
+            </a:r>
+            <a:br>
+              <a:rPr lang="en-US" dirty="0"/>
+            </a:br>
+            <a:r>
+              <a:rPr lang="en-US" dirty="0"/>
+              <a:t>There were </a:t>
+            </a:r>
+            <a:r>
+              <a:rPr lang="en-US" dirty="0" err="1"/>
+              <a:t>flashin</a:t>
+            </a:r>
+            <a:r>
+              <a:rPr lang="en-US" dirty="0"/>
+              <a:t>' lights</a:t>
+            </a:r>
+            <a:br>
+              <a:rPr lang="en-US" dirty="0"/>
+            </a:br>
+            <a:r>
+              <a:rPr lang="en-US" dirty="0"/>
+              <a:t>At least I had the decency</a:t>
+            </a:r>
+            <a:br>
+              <a:rPr lang="en-US" dirty="0"/>
+            </a:br>
+            <a:r>
+              <a:rPr lang="en-US" dirty="0"/>
+              <a:t>To keep my nights out of sight</a:t>
+            </a:r>
+            <a:br>
+              <a:rPr lang="en-US" dirty="0"/>
+            </a:br>
+            <a:r>
+              <a:rPr lang="en-US" dirty="0"/>
+              <a:t>Only rumors 'bout my hips and thighs</a:t>
+            </a:r>
+            <a:br>
+              <a:rPr lang="en-US" dirty="0"/>
+            </a:br>
+            <a:r>
+              <a:rPr lang="en-US" dirty="0"/>
+              <a:t>And my whispered sighs</a:t>
+            </a:r>
+            <a:br>
+              <a:rPr lang="en-US" dirty="0"/>
+            </a:br>
+            <a:r>
+              <a:rPr lang="en-US" dirty="0"/>
+              <a:t>Oh, Lord, I think about </a:t>
+            </a:r>
+            <a:r>
+              <a:rPr lang="en-US" dirty="0" err="1"/>
+              <a:t>jumpin</a:t>
+            </a:r>
+            <a:r>
+              <a:rPr lang="en-US" dirty="0"/>
+              <a:t>’</a:t>
+            </a:r>
+            <a:br>
+              <a:rPr lang="en-US" dirty="0"/>
+            </a:br>
+            <a:r>
+              <a:rPr lang="en-US" dirty="0"/>
+              <a:t>Off of very tall somethings</a:t>
+            </a:r>
+            <a:br>
+              <a:rPr lang="en-US" dirty="0"/>
+            </a:br>
+            <a:r>
+              <a:rPr lang="en-US" dirty="0"/>
+              <a:t>Just to see you come </a:t>
+            </a:r>
+            <a:r>
+              <a:rPr lang="en-US" dirty="0" err="1"/>
+              <a:t>runnin</a:t>
+            </a:r>
+            <a:r>
+              <a:rPr lang="en-US" dirty="0"/>
+              <a:t>' (</a:t>
+            </a:r>
+            <a:r>
+              <a:rPr lang="en-US" dirty="0" err="1"/>
+              <a:t>Runnin</a:t>
+            </a:r>
+            <a:r>
+              <a:rPr lang="en-US" dirty="0"/>
+              <a:t>’)</a:t>
+            </a:r>
+            <a:br>
+              <a:rPr lang="en-US" dirty="0"/>
+            </a:br>
+            <a:r>
+              <a:rPr lang="en-US" dirty="0"/>
+              <a:t>And say the one thing I've been wanting, but no</a:t>
+            </a:r>
+            <a:br>
+              <a:rPr lang="en-US" dirty="0"/>
+            </a:br>
+            <a:r>
+              <a:rPr lang="en-US" dirty="0"/>
+              <a:t>… </a:t>
+            </a:r>
+          </a:p>
+        </p:txBody>
+      </p:sp>
+      <p:sp>
+        <p:nvSpPr>
+          <p:cNvPr id="4" name="Tijdelijke aanduiding voor tekst 3">
+            <a:extLst>
+              <a:ext uri="{FF2B5EF4-FFF2-40B4-BE49-F238E27FC236}">
+                <a16:creationId xmlns:a16="http://schemas.microsoft.com/office/drawing/2014/main" id="{D07E70A0-97C6-CF6B-BA23-341C986B3BE2}"/>
+              </a:ext>
+            </a:extLst>
+          </p:cNvPr>
+          <p:cNvSpPr>
+            <a:spLocks noGrp="1"/>
+          </p:cNvSpPr>
+          <p:nvPr>
+            <p:ph type="body" sz="quarter" idx="3"/>
+          </p:nvPr>
+        </p:nvSpPr>
+        <p:spPr/>
+        <p:txBody>
+          <a:bodyPr/>
+          <a:lstStyle/>
+          <a:p>
+            <a:r>
+              <a:rPr lang="en-US" dirty="0" err="1"/>
+              <a:t>Oplossing</a:t>
+            </a:r>
+            <a:r>
+              <a:rPr lang="en-US" dirty="0"/>
+              <a:t> 1 | GPT-2 | 3 beams </a:t>
+            </a:r>
+          </a:p>
+        </p:txBody>
+      </p:sp>
+      <p:sp>
+        <p:nvSpPr>
+          <p:cNvPr id="6" name="Tijdelijke aanduiding voor voettekst 5">
+            <a:extLst>
+              <a:ext uri="{FF2B5EF4-FFF2-40B4-BE49-F238E27FC236}">
+                <a16:creationId xmlns:a16="http://schemas.microsoft.com/office/drawing/2014/main" id="{D694271A-79A7-D778-681E-8AC09F0FEEFE}"/>
+              </a:ext>
+            </a:extLst>
+          </p:cNvPr>
+          <p:cNvSpPr>
+            <a:spLocks noGrp="1"/>
+          </p:cNvSpPr>
+          <p:nvPr>
+            <p:ph type="ftr" sz="quarter" idx="11"/>
+          </p:nvPr>
+        </p:nvSpPr>
+        <p:spPr/>
+        <p:txBody>
+          <a:bodyPr/>
+          <a:lstStyle/>
+          <a:p>
+            <a:r>
+              <a:rPr lang="nl-NL"/>
+              <a:t>Computerwetenschappen - DTAI</a:t>
+            </a:r>
+            <a:endParaRPr lang="nl-NL" dirty="0"/>
+          </a:p>
+        </p:txBody>
+      </p:sp>
+      <p:sp>
+        <p:nvSpPr>
+          <p:cNvPr id="7" name="Tijdelijke aanduiding voor dianummer 6">
+            <a:extLst>
+              <a:ext uri="{FF2B5EF4-FFF2-40B4-BE49-F238E27FC236}">
+                <a16:creationId xmlns:a16="http://schemas.microsoft.com/office/drawing/2014/main" id="{34201561-A237-2CA1-0D6A-DEA701500839}"/>
+              </a:ext>
+            </a:extLst>
+          </p:cNvPr>
+          <p:cNvSpPr>
+            <a:spLocks noGrp="1"/>
+          </p:cNvSpPr>
+          <p:nvPr>
+            <p:ph type="sldNum" sz="quarter" idx="12"/>
+          </p:nvPr>
+        </p:nvSpPr>
+        <p:spPr/>
+        <p:txBody>
+          <a:bodyPr/>
+          <a:lstStyle/>
+          <a:p>
+            <a:fld id="{0A297500-7527-634B-90F4-69D0994C32B4}" type="slidenum">
+              <a:rPr lang="nl-NL" smtClean="0"/>
+              <a:t>11</a:t>
+            </a:fld>
+            <a:endParaRPr lang="nl-NL" dirty="0"/>
+          </a:p>
+        </p:txBody>
+      </p:sp>
+      <p:sp>
+        <p:nvSpPr>
+          <p:cNvPr id="8" name="Titel 7">
+            <a:extLst>
+              <a:ext uri="{FF2B5EF4-FFF2-40B4-BE49-F238E27FC236}">
+                <a16:creationId xmlns:a16="http://schemas.microsoft.com/office/drawing/2014/main" id="{046D607A-9B3D-58B0-3525-5F6CCE507F7F}"/>
+              </a:ext>
+            </a:extLst>
+          </p:cNvPr>
+          <p:cNvSpPr>
+            <a:spLocks noGrp="1"/>
+          </p:cNvSpPr>
+          <p:nvPr>
+            <p:ph type="title"/>
+          </p:nvPr>
+        </p:nvSpPr>
+        <p:spPr/>
+        <p:txBody>
+          <a:bodyPr>
+            <a:normAutofit fontScale="90000"/>
+          </a:bodyPr>
+          <a:lstStyle/>
+          <a:p>
+            <a:r>
+              <a:rPr lang="nl-NL" b="1" dirty="0"/>
+              <a:t>Huidig onderzoek: </a:t>
+            </a:r>
+            <a:r>
+              <a:rPr lang="nl-NL" dirty="0" err="1"/>
+              <a:t>Syllable</a:t>
+            </a:r>
+            <a:r>
+              <a:rPr lang="nl-NL" dirty="0"/>
+              <a:t> </a:t>
+            </a:r>
+            <a:r>
+              <a:rPr lang="nl-NL" dirty="0" err="1"/>
+              <a:t>Constraint</a:t>
+            </a:r>
+            <a:r>
+              <a:rPr lang="nl-NL" dirty="0"/>
+              <a:t> | Oplossing 1</a:t>
+            </a:r>
+            <a:endParaRPr lang="en-US" dirty="0"/>
+          </a:p>
+        </p:txBody>
+      </p:sp>
+      <p:sp>
+        <p:nvSpPr>
+          <p:cNvPr id="11" name="Tijdelijke aanduiding voor inhoud 2">
+            <a:extLst>
+              <a:ext uri="{FF2B5EF4-FFF2-40B4-BE49-F238E27FC236}">
+                <a16:creationId xmlns:a16="http://schemas.microsoft.com/office/drawing/2014/main" id="{40F85C12-A3E7-46ED-F685-C8F0C7874057}"/>
+              </a:ext>
+            </a:extLst>
+          </p:cNvPr>
+          <p:cNvSpPr txBox="1">
+            <a:spLocks/>
+          </p:cNvSpPr>
+          <p:nvPr/>
+        </p:nvSpPr>
+        <p:spPr>
+          <a:xfrm>
+            <a:off x="6194427" y="2263816"/>
+            <a:ext cx="5421575" cy="3837658"/>
+          </a:xfrm>
+          <a:prstGeom prst="rect">
+            <a:avLst/>
+          </a:prstGeom>
+          <a:solidFill>
+            <a:schemeClr val="accent6">
+              <a:lumMod val="20000"/>
+              <a:lumOff val="80000"/>
+            </a:schemeClr>
+          </a:solidFill>
+          <a:ln w="9525">
+            <a:solidFill>
+              <a:schemeClr val="accent1"/>
+            </a:solidFill>
+          </a:ln>
+        </p:spPr>
+        <p:txBody>
+          <a:bodyPr vert="horz" lIns="91440" tIns="45720" rIns="91440" bIns="45720" rtlCol="0">
+            <a:normAutofit fontScale="55000" lnSpcReduction="20000"/>
+          </a:bodyPr>
+          <a:lstStyle>
+            <a:lvl1pPr marL="228600" indent="-228600" algn="l" defTabSz="914400" rtl="0" eaLnBrk="1" latinLnBrk="0" hangingPunct="1">
+              <a:lnSpc>
+                <a:spcPct val="100000"/>
+              </a:lnSpc>
+              <a:spcBef>
+                <a:spcPts val="1000"/>
+              </a:spcBef>
+              <a:buFont typeface="Arial"/>
+              <a:buChar char="•"/>
+              <a:defRPr sz="2400" kern="1200" baseline="0">
+                <a:solidFill>
+                  <a:schemeClr val="tx1"/>
+                </a:solidFill>
+                <a:latin typeface="Arial" charset="0"/>
+                <a:ea typeface="+mn-ea"/>
+                <a:cs typeface="+mn-cs"/>
+              </a:defRPr>
+            </a:lvl1pPr>
+            <a:lvl2pPr marL="685800" indent="-228600" algn="l" defTabSz="914400" rtl="0" eaLnBrk="1" latinLnBrk="0" hangingPunct="1">
+              <a:lnSpc>
+                <a:spcPct val="100000"/>
+              </a:lnSpc>
+              <a:spcBef>
+                <a:spcPts val="500"/>
+              </a:spcBef>
+              <a:buFont typeface="Arial"/>
+              <a:buChar char="•"/>
+              <a:defRPr sz="2400" kern="1200" baseline="0">
+                <a:solidFill>
+                  <a:schemeClr val="tx1"/>
+                </a:solidFill>
+                <a:latin typeface="Arial" charset="0"/>
+                <a:ea typeface="+mn-ea"/>
+                <a:cs typeface="+mn-cs"/>
+              </a:defRPr>
+            </a:lvl2pPr>
+            <a:lvl3pPr marL="1143000" indent="-228600" algn="l" defTabSz="914400" rtl="0" eaLnBrk="1" latinLnBrk="0" hangingPunct="1">
+              <a:lnSpc>
+                <a:spcPct val="100000"/>
+              </a:lnSpc>
+              <a:spcBef>
+                <a:spcPts val="500"/>
+              </a:spcBef>
+              <a:buFont typeface="Arial"/>
+              <a:buChar char="•"/>
+              <a:defRPr sz="2000" kern="1200" baseline="0">
+                <a:solidFill>
+                  <a:schemeClr val="tx1"/>
+                </a:solidFill>
+                <a:latin typeface="Arial" charset="0"/>
+                <a:ea typeface="+mn-ea"/>
+                <a:cs typeface="+mn-cs"/>
+              </a:defRPr>
+            </a:lvl3pPr>
+            <a:lvl4pPr marL="1600200" indent="-228600" algn="l" defTabSz="914400" rtl="0" eaLnBrk="1" latinLnBrk="0" hangingPunct="1">
+              <a:lnSpc>
+                <a:spcPct val="100000"/>
+              </a:lnSpc>
+              <a:spcBef>
+                <a:spcPts val="500"/>
+              </a:spcBef>
+              <a:buFont typeface="Arial"/>
+              <a:buChar char="•"/>
+              <a:defRPr sz="1800" kern="1200" baseline="0">
+                <a:solidFill>
+                  <a:schemeClr val="tx1"/>
+                </a:solidFill>
+                <a:latin typeface="Arial" charset="0"/>
+                <a:ea typeface="+mn-ea"/>
+                <a:cs typeface="+mn-cs"/>
+              </a:defRPr>
+            </a:lvl4pPr>
+            <a:lvl5pPr marL="2057400" indent="-228600" algn="l" defTabSz="914400" rtl="0" eaLnBrk="1" latinLnBrk="0" hangingPunct="1">
+              <a:lnSpc>
+                <a:spcPct val="100000"/>
+              </a:lnSpc>
+              <a:spcBef>
+                <a:spcPts val="500"/>
+              </a:spcBef>
+              <a:buFont typeface="Arial"/>
+              <a:buChar char="•"/>
+              <a:defRPr sz="1800" kern="1200" baseline="0">
+                <a:solidFill>
+                  <a:schemeClr val="tx1"/>
+                </a:solidFill>
+                <a:latin typeface="Arial" charset="0"/>
+                <a:ea typeface="+mn-ea"/>
+                <a:cs typeface="+mn-cs"/>
+              </a:defRPr>
+            </a:lvl5pPr>
+            <a:lvl6pPr marL="2514600" indent="-228600" algn="l" defTabSz="914400" rtl="0" eaLnBrk="1" latinLnBrk="0" hangingPunct="1">
+              <a:lnSpc>
+                <a:spcPct val="90000"/>
+              </a:lnSpc>
+              <a:spcBef>
+                <a:spcPts val="500"/>
+              </a:spcBef>
+              <a:buFont typeface="Arial"/>
+              <a:buChar char="•"/>
+              <a:defRPr sz="1800" kern="1200">
+                <a:solidFill>
+                  <a:schemeClr val="tx1"/>
+                </a:solidFill>
+                <a:latin typeface="+mn-lt"/>
+                <a:ea typeface="+mn-ea"/>
+                <a:cs typeface="+mn-cs"/>
+              </a:defRPr>
+            </a:lvl6pPr>
+            <a:lvl7pPr marL="2971800" indent="-228600" algn="l" defTabSz="914400" rtl="0" eaLnBrk="1" latinLnBrk="0" hangingPunct="1">
+              <a:lnSpc>
+                <a:spcPct val="90000"/>
+              </a:lnSpc>
+              <a:spcBef>
+                <a:spcPts val="500"/>
+              </a:spcBef>
+              <a:buFont typeface="Arial"/>
+              <a:buChar char="•"/>
+              <a:defRPr sz="1800" kern="1200">
+                <a:solidFill>
+                  <a:schemeClr val="tx1"/>
+                </a:solidFill>
+                <a:latin typeface="+mn-lt"/>
+                <a:ea typeface="+mn-ea"/>
+                <a:cs typeface="+mn-cs"/>
+              </a:defRPr>
+            </a:lvl7pPr>
+            <a:lvl8pPr marL="3429000" indent="-228600" algn="l" defTabSz="914400" rtl="0" eaLnBrk="1" latinLnBrk="0" hangingPunct="1">
+              <a:lnSpc>
+                <a:spcPct val="90000"/>
+              </a:lnSpc>
+              <a:spcBef>
+                <a:spcPts val="500"/>
+              </a:spcBef>
+              <a:buFont typeface="Arial"/>
+              <a:buChar char="•"/>
+              <a:defRPr sz="1800" kern="1200">
+                <a:solidFill>
+                  <a:schemeClr val="tx1"/>
+                </a:solidFill>
+                <a:latin typeface="+mn-lt"/>
+                <a:ea typeface="+mn-ea"/>
+                <a:cs typeface="+mn-cs"/>
+              </a:defRPr>
+            </a:lvl8pPr>
+            <a:lvl9pPr marL="3886200" indent="-228600" algn="l" defTabSz="914400" rtl="0" eaLnBrk="1" latinLnBrk="0" hangingPunct="1">
+              <a:lnSpc>
+                <a:spcPct val="90000"/>
+              </a:lnSpc>
+              <a:spcBef>
+                <a:spcPts val="500"/>
+              </a:spcBef>
+              <a:buFont typeface="Arial"/>
+              <a:buChar char="•"/>
+              <a:defRPr sz="1800" kern="1200">
+                <a:solidFill>
+                  <a:schemeClr val="tx1"/>
+                </a:solidFill>
+                <a:latin typeface="+mn-lt"/>
+                <a:ea typeface="+mn-ea"/>
+                <a:cs typeface="+mn-cs"/>
+              </a:defRPr>
+            </a:lvl9pPr>
+          </a:lstStyle>
+          <a:p>
+            <a:pPr marL="0" indent="0">
+              <a:lnSpc>
+                <a:spcPct val="120000"/>
+              </a:lnSpc>
+              <a:buFont typeface="Arial"/>
+              <a:buNone/>
+            </a:pPr>
+            <a:r>
+              <a:rPr lang="en-US" dirty="0"/>
+              <a:t>…</a:t>
+            </a:r>
+            <a:br>
+              <a:rPr lang="en-US" dirty="0"/>
+            </a:br>
+            <a:r>
+              <a:rPr lang="en-US" dirty="0"/>
+              <a:t>[Post-Chorus]</a:t>
+            </a:r>
+            <a:br>
+              <a:rPr lang="en-US" dirty="0"/>
+            </a:br>
+            <a:r>
+              <a:rPr lang="en-US" dirty="0"/>
+              <a:t>Yeah I</a:t>
+            </a:r>
+            <a:br>
+              <a:rPr lang="en-US" dirty="0"/>
+            </a:br>
+            <a:r>
+              <a:rPr lang="en-US" dirty="0"/>
+              <a:t>Are you sure you </a:t>
+            </a:r>
+            <a:r>
+              <a:rPr lang="en-US" dirty="0" err="1"/>
+              <a:t>wanna</a:t>
+            </a:r>
+            <a:br>
+              <a:rPr lang="en-US" dirty="0"/>
+            </a:br>
+            <a:r>
+              <a:rPr lang="en-US" dirty="0"/>
+              <a:t>Uh-uh</a:t>
+            </a:r>
+            <a:br>
+              <a:rPr lang="en-US" dirty="0"/>
+            </a:br>
+            <a:r>
+              <a:rPr lang="en-US" dirty="0"/>
+              <a:t>Well I guess it</a:t>
+            </a:r>
+          </a:p>
+          <a:p>
+            <a:pPr marL="0" indent="0">
+              <a:lnSpc>
+                <a:spcPct val="120000"/>
+              </a:lnSpc>
+              <a:buFont typeface="Arial"/>
+              <a:buNone/>
+            </a:pPr>
+            <a:r>
+              <a:rPr lang="en-US" dirty="0"/>
+              <a:t>[Bridge]</a:t>
+            </a:r>
+            <a:br>
+              <a:rPr lang="en-US" dirty="0"/>
+            </a:br>
+            <a:r>
+              <a:rPr lang="en-US" dirty="0"/>
+              <a:t>Think I don´t know who </a:t>
+            </a:r>
+            <a:br>
+              <a:rPr lang="en-US" dirty="0"/>
+            </a:br>
+            <a:r>
+              <a:rPr lang="en-US" dirty="0"/>
+              <a:t>They're all flashing and</a:t>
+            </a:r>
+            <a:br>
+              <a:rPr lang="en-US" dirty="0"/>
+            </a:br>
+            <a:r>
+              <a:rPr lang="en-US" dirty="0"/>
+              <a:t>All I want is to see you cry</a:t>
+            </a:r>
+            <a:br>
+              <a:rPr lang="en-US" dirty="0"/>
+            </a:br>
+            <a:r>
+              <a:rPr lang="en-US" dirty="0"/>
+              <a:t>For you to keep me from seeing</a:t>
+            </a:r>
+            <a:br>
+              <a:rPr lang="en-US" dirty="0"/>
+            </a:br>
+            <a:r>
+              <a:rPr lang="en-US" dirty="0"/>
+              <a:t>Whoa whoa what are you talking about</a:t>
+            </a:r>
+            <a:br>
+              <a:rPr lang="en-US" dirty="0"/>
+            </a:br>
+            <a:r>
+              <a:rPr lang="en-US" dirty="0"/>
+              <a:t>Pineapple should be off</a:t>
+            </a:r>
+            <a:br>
+              <a:rPr lang="en-US" dirty="0"/>
+            </a:br>
+            <a:r>
+              <a:rPr lang="en-US" dirty="0"/>
+              <a:t>Ooh yeah I love you so much I</a:t>
+            </a:r>
+            <a:br>
+              <a:rPr lang="en-US" dirty="0"/>
+            </a:br>
+            <a:r>
+              <a:rPr lang="en-US" dirty="0"/>
+              <a:t>On the roof of my head and</a:t>
+            </a:r>
+            <a:br>
+              <a:rPr lang="en-US" dirty="0"/>
+            </a:br>
+            <a:r>
+              <a:rPr lang="en-US" dirty="0"/>
+              <a:t>Hey I </a:t>
+            </a:r>
+            <a:r>
+              <a:rPr lang="en-US" dirty="0" err="1"/>
+              <a:t>wanna</a:t>
+            </a:r>
+            <a:r>
+              <a:rPr lang="en-US" dirty="0"/>
+              <a:t> see your face (Come run</a:t>
+            </a:r>
+            <a:br>
+              <a:rPr lang="en-US" dirty="0"/>
+            </a:br>
+            <a:r>
+              <a:rPr lang="en-US" dirty="0"/>
+              <a:t>Parody is an art form that uses a</a:t>
+            </a:r>
+            <a:br>
+              <a:rPr lang="en-US" dirty="0"/>
+            </a:br>
+            <a:r>
+              <a:rPr lang="en-US" dirty="0"/>
+              <a:t>… </a:t>
+            </a:r>
+          </a:p>
+        </p:txBody>
+      </p:sp>
+    </p:spTree>
+    <p:extLst>
+      <p:ext uri="{BB962C8B-B14F-4D97-AF65-F5344CB8AC3E}">
+        <p14:creationId xmlns:p14="http://schemas.microsoft.com/office/powerpoint/2010/main" val="3205543681"/>
+      </p:ext>
+    </p:extLst>
+  </p:cSld>
+  <p:clrMapOvr>
+    <a:masterClrMapping/>
+  </p:clrMapOvr>
+</p:sld>
+</file>
+
+<file path=ppt/slides/slide12.xml><?xml version="1.0" encoding="utf-8"?>
+<p:sld xmlns:a="http://schemas.openxmlformats.org/drawingml/2006/main" xmlns:r="http://schemas.openxmlformats.org/officeDocument/2006/relationships" xmlns:p="http://schemas.openxmlformats.org/presentationml/2006/main">
+  <p:cSld>
+    <p:spTree>
+      <p:nvGrpSpPr>
+        <p:cNvPr id="1" name=""/>
+        <p:cNvGrpSpPr/>
+        <p:nvPr/>
+      </p:nvGrpSpPr>
+      <p:grpSpPr>
+        <a:xfrm>
+          <a:off x="0" y="0"/>
+          <a:ext cx="0" cy="0"/>
+          <a:chOff x="0" y="0"/>
+          <a:chExt cx="0" cy="0"/>
+        </a:xfrm>
+      </p:grpSpPr>
+      <p:sp>
+        <p:nvSpPr>
+          <p:cNvPr id="2" name="Tijdelijke aanduiding voor inhoud 1">
+            <a:extLst>
+              <a:ext uri="{FF2B5EF4-FFF2-40B4-BE49-F238E27FC236}">
+                <a16:creationId xmlns:a16="http://schemas.microsoft.com/office/drawing/2014/main" id="{8D288603-303F-0724-CCF3-141C085F2330}"/>
+              </a:ext>
+            </a:extLst>
+          </p:cNvPr>
+          <p:cNvSpPr>
+            <a:spLocks noGrp="1"/>
+          </p:cNvSpPr>
+          <p:nvPr>
+            <p:ph idx="1"/>
+          </p:nvPr>
+        </p:nvSpPr>
+        <p:spPr/>
+        <p:txBody>
+          <a:bodyPr/>
+          <a:lstStyle/>
+          <a:p>
+            <a:r>
+              <a:rPr lang="nl-NL" dirty="0"/>
+              <a:t>Tekst in één keer generen</a:t>
+            </a:r>
+          </a:p>
+          <a:p>
+            <a:r>
+              <a:rPr lang="nl-NL" dirty="0"/>
+              <a:t>Gebruikt meer memory</a:t>
+            </a:r>
+          </a:p>
+          <a:p>
+            <a:r>
+              <a:rPr lang="nl-NL" dirty="0"/>
+              <a:t>Prompt:</a:t>
+            </a:r>
+          </a:p>
+          <a:p>
+            <a:pPr lvl="1"/>
+            <a:r>
+              <a:rPr lang="nl-NL" dirty="0"/>
+              <a:t>Context + nieuw onderwerp + (originele tekst)</a:t>
+            </a:r>
+          </a:p>
+          <a:p>
+            <a:r>
+              <a:rPr lang="nl-NL" dirty="0" err="1"/>
+              <a:t>Constraint</a:t>
+            </a:r>
+            <a:r>
+              <a:rPr lang="nl-NL" dirty="0"/>
+              <a:t>:</a:t>
+            </a:r>
+          </a:p>
+          <a:p>
+            <a:pPr lvl="1"/>
+            <a:r>
+              <a:rPr lang="nl-NL" dirty="0"/>
+              <a:t>Als de huidige lijn &gt;= # lettergrepen heeft </a:t>
+            </a:r>
+            <a:r>
+              <a:rPr lang="nl-NL" dirty="0">
+                <a:sym typeface="Wingdings" pitchFamily="2" charset="2"/>
+              </a:rPr>
+              <a:t> ‘\n’ token geforceerd</a:t>
+            </a:r>
+            <a:endParaRPr lang="nl-NL" dirty="0"/>
+          </a:p>
+          <a:p>
+            <a:pPr lvl="1"/>
+            <a:r>
+              <a:rPr lang="nl-NL" dirty="0"/>
+              <a:t>Beam score aangepast:</a:t>
+            </a:r>
+          </a:p>
+          <a:p>
+            <a:pPr lvl="2"/>
+            <a:r>
+              <a:rPr lang="nl-NL" dirty="0">
+                <a:sym typeface="Wingdings" pitchFamily="2" charset="2"/>
+              </a:rPr>
+              <a:t># lettergrepen van de </a:t>
+            </a:r>
+            <a:r>
+              <a:rPr lang="nl-NL" dirty="0" err="1">
+                <a:sym typeface="Wingdings" pitchFamily="2" charset="2"/>
+              </a:rPr>
+              <a:t>beam</a:t>
+            </a:r>
+            <a:r>
+              <a:rPr lang="nl-NL" dirty="0">
+                <a:sym typeface="Wingdings" pitchFamily="2" charset="2"/>
+              </a:rPr>
+              <a:t> &gt; het gevraagde  score + score*0.1</a:t>
+            </a:r>
+          </a:p>
+          <a:p>
+            <a:pPr lvl="1"/>
+            <a:r>
+              <a:rPr lang="nl-NL" dirty="0">
+                <a:sym typeface="Wingdings" pitchFamily="2" charset="2"/>
+              </a:rPr>
+              <a:t>Generatie stopt als alle lijnen met het gevraagde # lettergrepen gegenereerd zijn</a:t>
+            </a:r>
+            <a:endParaRPr lang="nl-NL" dirty="0"/>
+          </a:p>
+          <a:p>
+            <a:pPr lvl="1"/>
+            <a:endParaRPr lang="nl-NL" dirty="0"/>
+          </a:p>
+          <a:p>
+            <a:endParaRPr lang="nl-NL" dirty="0"/>
+          </a:p>
+          <a:p>
+            <a:endParaRPr lang="en-US" dirty="0"/>
+          </a:p>
+        </p:txBody>
+      </p:sp>
+      <p:sp>
+        <p:nvSpPr>
+          <p:cNvPr id="3" name="Tijdelijke aanduiding voor voettekst 2">
+            <a:extLst>
+              <a:ext uri="{FF2B5EF4-FFF2-40B4-BE49-F238E27FC236}">
+                <a16:creationId xmlns:a16="http://schemas.microsoft.com/office/drawing/2014/main" id="{0D2E83D0-98F2-725C-37AD-F7A9F59D168B}"/>
+              </a:ext>
+            </a:extLst>
+          </p:cNvPr>
+          <p:cNvSpPr>
+            <a:spLocks noGrp="1"/>
+          </p:cNvSpPr>
+          <p:nvPr>
+            <p:ph type="ftr" sz="quarter" idx="11"/>
+          </p:nvPr>
+        </p:nvSpPr>
+        <p:spPr/>
+        <p:txBody>
+          <a:bodyPr/>
+          <a:lstStyle/>
+          <a:p>
+            <a:r>
+              <a:rPr lang="nl-NL"/>
+              <a:t>Computerwetenschappen - DTAI</a:t>
+            </a:r>
+            <a:endParaRPr lang="nl-NL" dirty="0"/>
+          </a:p>
+        </p:txBody>
+      </p:sp>
+      <p:sp>
+        <p:nvSpPr>
+          <p:cNvPr id="4" name="Tijdelijke aanduiding voor dianummer 3">
+            <a:extLst>
+              <a:ext uri="{FF2B5EF4-FFF2-40B4-BE49-F238E27FC236}">
+                <a16:creationId xmlns:a16="http://schemas.microsoft.com/office/drawing/2014/main" id="{9E1256A1-BFBE-9BE1-93E4-20ACD8C4DD25}"/>
+              </a:ext>
+            </a:extLst>
+          </p:cNvPr>
+          <p:cNvSpPr>
+            <a:spLocks noGrp="1"/>
+          </p:cNvSpPr>
+          <p:nvPr>
+            <p:ph type="sldNum" sz="quarter" idx="12"/>
+          </p:nvPr>
+        </p:nvSpPr>
+        <p:spPr/>
+        <p:txBody>
+          <a:bodyPr/>
+          <a:lstStyle/>
+          <a:p>
+            <a:fld id="{0A297500-7527-634B-90F4-69D0994C32B4}" type="slidenum">
+              <a:rPr lang="nl-NL" smtClean="0"/>
+              <a:t>12</a:t>
+            </a:fld>
+            <a:endParaRPr lang="nl-NL" dirty="0"/>
+          </a:p>
+        </p:txBody>
+      </p:sp>
+      <p:sp>
+        <p:nvSpPr>
+          <p:cNvPr id="5" name="Titel 4">
+            <a:extLst>
+              <a:ext uri="{FF2B5EF4-FFF2-40B4-BE49-F238E27FC236}">
+                <a16:creationId xmlns:a16="http://schemas.microsoft.com/office/drawing/2014/main" id="{415854D7-1AE3-F228-A4E5-6F63AEB69F4D}"/>
+              </a:ext>
+            </a:extLst>
+          </p:cNvPr>
+          <p:cNvSpPr>
+            <a:spLocks noGrp="1"/>
+          </p:cNvSpPr>
+          <p:nvPr>
+            <p:ph type="title"/>
+          </p:nvPr>
+        </p:nvSpPr>
+        <p:spPr/>
+        <p:txBody>
+          <a:bodyPr>
+            <a:normAutofit fontScale="90000"/>
+          </a:bodyPr>
+          <a:lstStyle/>
+          <a:p>
+            <a:r>
+              <a:rPr lang="nl-NL" b="1" dirty="0"/>
+              <a:t>Huidig onderzoek: </a:t>
+            </a:r>
+            <a:r>
+              <a:rPr lang="nl-NL" dirty="0" err="1"/>
+              <a:t>Syllable</a:t>
+            </a:r>
+            <a:r>
+              <a:rPr lang="nl-NL" dirty="0"/>
+              <a:t> </a:t>
+            </a:r>
+            <a:r>
+              <a:rPr lang="nl-NL" dirty="0" err="1"/>
+              <a:t>Constraint</a:t>
+            </a:r>
+            <a:r>
+              <a:rPr lang="nl-NL" dirty="0"/>
+              <a:t> | Oplossing 2</a:t>
+            </a:r>
+            <a:endParaRPr lang="en-US" dirty="0"/>
+          </a:p>
+        </p:txBody>
+      </p:sp>
+    </p:spTree>
+    <p:extLst>
+      <p:ext uri="{BB962C8B-B14F-4D97-AF65-F5344CB8AC3E}">
+        <p14:creationId xmlns:p14="http://schemas.microsoft.com/office/powerpoint/2010/main" val="3174511064"/>
+      </p:ext>
+    </p:extLst>
+  </p:cSld>
+  <p:clrMapOvr>
+    <a:masterClrMapping/>
+  </p:clrMapOvr>
+</p:sld>
+</file>
+
+<file path=ppt/slides/slide13.xml><?xml version="1.0" encoding="utf-8"?>
+<p:sld xmlns:a="http://schemas.openxmlformats.org/drawingml/2006/main" xmlns:r="http://schemas.openxmlformats.org/officeDocument/2006/relationships" xmlns:p="http://schemas.openxmlformats.org/presentationml/2006/main">
+  <p:cSld>
+    <p:spTree>
+      <p:nvGrpSpPr>
+        <p:cNvPr id="1" name=""/>
+        <p:cNvGrpSpPr/>
+        <p:nvPr/>
+      </p:nvGrpSpPr>
+      <p:grpSpPr>
+        <a:xfrm>
+          <a:off x="0" y="0"/>
+          <a:ext cx="0" cy="0"/>
+          <a:chOff x="0" y="0"/>
+          <a:chExt cx="0" cy="0"/>
+        </a:xfrm>
+      </p:grpSpPr>
+      <p:sp>
+        <p:nvSpPr>
+          <p:cNvPr id="2" name="Tijdelijke aanduiding voor tekst 1">
+            <a:extLst>
+              <a:ext uri="{FF2B5EF4-FFF2-40B4-BE49-F238E27FC236}">
+                <a16:creationId xmlns:a16="http://schemas.microsoft.com/office/drawing/2014/main" id="{826263D6-814D-E57A-AB89-B2ABCA69F3C1}"/>
+              </a:ext>
+            </a:extLst>
+          </p:cNvPr>
+          <p:cNvSpPr>
+            <a:spLocks noGrp="1"/>
+          </p:cNvSpPr>
+          <p:nvPr>
+            <p:ph type="body" idx="1"/>
+          </p:nvPr>
+        </p:nvSpPr>
+        <p:spPr/>
+        <p:txBody>
+          <a:bodyPr/>
+          <a:lstStyle/>
+          <a:p>
+            <a:r>
+              <a:rPr lang="en-US" dirty="0" err="1"/>
+              <a:t>Origineel</a:t>
+            </a:r>
+            <a:endParaRPr lang="en-US" dirty="0"/>
+          </a:p>
+        </p:txBody>
+      </p:sp>
+      <p:sp>
+        <p:nvSpPr>
+          <p:cNvPr id="3" name="Tijdelijke aanduiding voor inhoud 2">
+            <a:extLst>
+              <a:ext uri="{FF2B5EF4-FFF2-40B4-BE49-F238E27FC236}">
+                <a16:creationId xmlns:a16="http://schemas.microsoft.com/office/drawing/2014/main" id="{4B5594B7-B2F6-ECDD-D41B-2D5DAC365C51}"/>
+              </a:ext>
+            </a:extLst>
+          </p:cNvPr>
+          <p:cNvSpPr>
+            <a:spLocks noGrp="1"/>
+          </p:cNvSpPr>
+          <p:nvPr>
+            <p:ph sz="half" idx="2"/>
+          </p:nvPr>
+        </p:nvSpPr>
+        <p:spPr>
+          <a:solidFill>
+            <a:schemeClr val="tx2">
+              <a:lumMod val="20000"/>
+              <a:lumOff val="80000"/>
+            </a:schemeClr>
+          </a:solidFill>
+          <a:ln w="9525">
+            <a:solidFill>
+              <a:schemeClr val="accent1"/>
+            </a:solidFill>
+          </a:ln>
+        </p:spPr>
+        <p:txBody>
+          <a:bodyPr>
+            <a:normAutofit fontScale="55000" lnSpcReduction="20000"/>
+          </a:bodyPr>
+          <a:lstStyle/>
+          <a:p>
+            <a:pPr marL="0" indent="0">
+              <a:lnSpc>
+                <a:spcPct val="120000"/>
+              </a:lnSpc>
+              <a:buNone/>
+            </a:pPr>
+            <a:r>
+              <a:rPr lang="en-US" dirty="0"/>
+              <a:t>…</a:t>
+            </a:r>
+            <a:br>
+              <a:rPr lang="en-US" dirty="0"/>
+            </a:br>
+            <a:r>
+              <a:rPr lang="en-US" dirty="0"/>
+              <a:t>[Post-Chorus]</a:t>
+            </a:r>
+            <a:br>
+              <a:rPr lang="en-US" dirty="0"/>
+            </a:br>
+            <a:r>
+              <a:rPr lang="en-US" dirty="0"/>
+              <a:t>Uh-huh</a:t>
+            </a:r>
+            <a:br>
+              <a:rPr lang="en-US" dirty="0"/>
+            </a:br>
+            <a:r>
+              <a:rPr lang="en-US" dirty="0"/>
+              <a:t>(Is it? Is it? Is it?)</a:t>
+            </a:r>
+            <a:br>
+              <a:rPr lang="en-US" dirty="0"/>
+            </a:br>
+            <a:r>
+              <a:rPr lang="en-US" dirty="0"/>
+              <a:t>Uh-huh</a:t>
+            </a:r>
+            <a:br>
+              <a:rPr lang="en-US" dirty="0"/>
+            </a:br>
+            <a:r>
+              <a:rPr lang="en-US" dirty="0"/>
+              <a:t>(Is it? Is it?)</a:t>
+            </a:r>
+          </a:p>
+          <a:p>
+            <a:pPr marL="0" indent="0">
+              <a:lnSpc>
+                <a:spcPct val="120000"/>
+              </a:lnSpc>
+              <a:buNone/>
+            </a:pPr>
+            <a:r>
+              <a:rPr lang="en-US" dirty="0"/>
+              <a:t>[Bridge]</a:t>
+            </a:r>
+            <a:br>
+              <a:rPr lang="en-US" dirty="0"/>
+            </a:br>
+            <a:r>
+              <a:rPr lang="en-US" dirty="0"/>
+              <a:t>Think I didn't see you?</a:t>
+            </a:r>
+            <a:br>
+              <a:rPr lang="en-US" dirty="0"/>
+            </a:br>
+            <a:r>
+              <a:rPr lang="en-US" dirty="0"/>
+              <a:t>There were </a:t>
+            </a:r>
+            <a:r>
+              <a:rPr lang="en-US" dirty="0" err="1"/>
+              <a:t>flashin</a:t>
+            </a:r>
+            <a:r>
+              <a:rPr lang="en-US" dirty="0"/>
+              <a:t>' lights</a:t>
+            </a:r>
+            <a:br>
+              <a:rPr lang="en-US" dirty="0"/>
+            </a:br>
+            <a:r>
+              <a:rPr lang="en-US" dirty="0"/>
+              <a:t>At least I had the decency</a:t>
+            </a:r>
+            <a:br>
+              <a:rPr lang="en-US" dirty="0"/>
+            </a:br>
+            <a:r>
+              <a:rPr lang="en-US" dirty="0"/>
+              <a:t>To keep my nights out of sight</a:t>
+            </a:r>
+            <a:br>
+              <a:rPr lang="en-US" dirty="0"/>
+            </a:br>
+            <a:r>
+              <a:rPr lang="en-US" dirty="0"/>
+              <a:t>Only rumors 'bout my hips and thighs</a:t>
+            </a:r>
+            <a:br>
+              <a:rPr lang="en-US" dirty="0"/>
+            </a:br>
+            <a:r>
+              <a:rPr lang="en-US" dirty="0"/>
+              <a:t>And my whispered sighs</a:t>
+            </a:r>
+            <a:br>
+              <a:rPr lang="en-US" dirty="0"/>
+            </a:br>
+            <a:r>
+              <a:rPr lang="en-US" dirty="0"/>
+              <a:t>Oh, Lord, I think about </a:t>
+            </a:r>
+            <a:r>
+              <a:rPr lang="en-US" dirty="0" err="1"/>
+              <a:t>jumpin</a:t>
+            </a:r>
+            <a:r>
+              <a:rPr lang="en-US" dirty="0"/>
+              <a:t>’</a:t>
+            </a:r>
+            <a:br>
+              <a:rPr lang="en-US" dirty="0"/>
+            </a:br>
+            <a:r>
+              <a:rPr lang="en-US" dirty="0"/>
+              <a:t>Off of very tall somethings</a:t>
+            </a:r>
+            <a:br>
+              <a:rPr lang="en-US" dirty="0"/>
+            </a:br>
+            <a:r>
+              <a:rPr lang="en-US" dirty="0"/>
+              <a:t>Just to see you come </a:t>
+            </a:r>
+            <a:r>
+              <a:rPr lang="en-US" dirty="0" err="1"/>
+              <a:t>runnin</a:t>
+            </a:r>
+            <a:r>
+              <a:rPr lang="en-US" dirty="0"/>
+              <a:t>' (</a:t>
+            </a:r>
+            <a:r>
+              <a:rPr lang="en-US" dirty="0" err="1"/>
+              <a:t>Runnin</a:t>
+            </a:r>
+            <a:r>
+              <a:rPr lang="en-US" dirty="0"/>
+              <a:t>’)</a:t>
+            </a:r>
+            <a:br>
+              <a:rPr lang="en-US" dirty="0"/>
+            </a:br>
+            <a:r>
+              <a:rPr lang="en-US" dirty="0"/>
+              <a:t>And say the one thing I've been wanting, but no</a:t>
+            </a:r>
+            <a:br>
+              <a:rPr lang="en-US" dirty="0"/>
+            </a:br>
+            <a:r>
+              <a:rPr lang="en-US" dirty="0"/>
+              <a:t>… </a:t>
+            </a:r>
+          </a:p>
+        </p:txBody>
+      </p:sp>
+      <p:sp>
+        <p:nvSpPr>
+          <p:cNvPr id="4" name="Tijdelijke aanduiding voor tekst 3">
+            <a:extLst>
+              <a:ext uri="{FF2B5EF4-FFF2-40B4-BE49-F238E27FC236}">
+                <a16:creationId xmlns:a16="http://schemas.microsoft.com/office/drawing/2014/main" id="{D07E70A0-97C6-CF6B-BA23-341C986B3BE2}"/>
+              </a:ext>
+            </a:extLst>
+          </p:cNvPr>
+          <p:cNvSpPr>
+            <a:spLocks noGrp="1"/>
+          </p:cNvSpPr>
+          <p:nvPr>
+            <p:ph type="body" sz="quarter" idx="3"/>
+          </p:nvPr>
+        </p:nvSpPr>
+        <p:spPr/>
+        <p:txBody>
+          <a:bodyPr/>
+          <a:lstStyle/>
+          <a:p>
+            <a:r>
+              <a:rPr lang="en-US" dirty="0" err="1"/>
+              <a:t>Oplossing</a:t>
+            </a:r>
+            <a:r>
+              <a:rPr lang="en-US" dirty="0"/>
+              <a:t> 2 | GPT-2 | 2 beams </a:t>
+            </a:r>
+          </a:p>
+        </p:txBody>
+      </p:sp>
+      <p:sp>
+        <p:nvSpPr>
+          <p:cNvPr id="6" name="Tijdelijke aanduiding voor voettekst 5">
+            <a:extLst>
+              <a:ext uri="{FF2B5EF4-FFF2-40B4-BE49-F238E27FC236}">
+                <a16:creationId xmlns:a16="http://schemas.microsoft.com/office/drawing/2014/main" id="{D694271A-79A7-D778-681E-8AC09F0FEEFE}"/>
+              </a:ext>
+            </a:extLst>
+          </p:cNvPr>
+          <p:cNvSpPr>
+            <a:spLocks noGrp="1"/>
+          </p:cNvSpPr>
+          <p:nvPr>
+            <p:ph type="ftr" sz="quarter" idx="11"/>
+          </p:nvPr>
+        </p:nvSpPr>
+        <p:spPr/>
+        <p:txBody>
+          <a:bodyPr/>
+          <a:lstStyle/>
+          <a:p>
+            <a:r>
+              <a:rPr lang="nl-NL"/>
+              <a:t>Computerwetenschappen - DTAI</a:t>
+            </a:r>
+            <a:endParaRPr lang="nl-NL" dirty="0"/>
+          </a:p>
+        </p:txBody>
+      </p:sp>
+      <p:sp>
+        <p:nvSpPr>
+          <p:cNvPr id="7" name="Tijdelijke aanduiding voor dianummer 6">
+            <a:extLst>
+              <a:ext uri="{FF2B5EF4-FFF2-40B4-BE49-F238E27FC236}">
+                <a16:creationId xmlns:a16="http://schemas.microsoft.com/office/drawing/2014/main" id="{34201561-A237-2CA1-0D6A-DEA701500839}"/>
+              </a:ext>
+            </a:extLst>
+          </p:cNvPr>
+          <p:cNvSpPr>
+            <a:spLocks noGrp="1"/>
+          </p:cNvSpPr>
+          <p:nvPr>
+            <p:ph type="sldNum" sz="quarter" idx="12"/>
+          </p:nvPr>
+        </p:nvSpPr>
+        <p:spPr/>
+        <p:txBody>
+          <a:bodyPr/>
+          <a:lstStyle/>
+          <a:p>
+            <a:fld id="{0A297500-7527-634B-90F4-69D0994C32B4}" type="slidenum">
+              <a:rPr lang="nl-NL" smtClean="0"/>
+              <a:t>13</a:t>
+            </a:fld>
+            <a:endParaRPr lang="nl-NL" dirty="0"/>
+          </a:p>
+        </p:txBody>
+      </p:sp>
+      <p:sp>
+        <p:nvSpPr>
+          <p:cNvPr id="8" name="Titel 7">
+            <a:extLst>
+              <a:ext uri="{FF2B5EF4-FFF2-40B4-BE49-F238E27FC236}">
+                <a16:creationId xmlns:a16="http://schemas.microsoft.com/office/drawing/2014/main" id="{046D607A-9B3D-58B0-3525-5F6CCE507F7F}"/>
+              </a:ext>
+            </a:extLst>
+          </p:cNvPr>
+          <p:cNvSpPr>
+            <a:spLocks noGrp="1"/>
+          </p:cNvSpPr>
+          <p:nvPr>
+            <p:ph type="title"/>
+          </p:nvPr>
+        </p:nvSpPr>
+        <p:spPr/>
+        <p:txBody>
+          <a:bodyPr>
+            <a:normAutofit fontScale="90000"/>
+          </a:bodyPr>
+          <a:lstStyle/>
+          <a:p>
+            <a:r>
+              <a:rPr lang="nl-NL" b="1" dirty="0"/>
+              <a:t>Huidig onderzoek: </a:t>
+            </a:r>
+            <a:r>
+              <a:rPr lang="nl-NL" dirty="0" err="1"/>
+              <a:t>Syllable</a:t>
+            </a:r>
+            <a:r>
+              <a:rPr lang="nl-NL" dirty="0"/>
+              <a:t> </a:t>
+            </a:r>
+            <a:r>
+              <a:rPr lang="nl-NL" dirty="0" err="1"/>
+              <a:t>Constraint</a:t>
+            </a:r>
+            <a:r>
+              <a:rPr lang="nl-NL" dirty="0"/>
+              <a:t> | Oplossing 2</a:t>
+            </a:r>
+            <a:endParaRPr lang="en-US" dirty="0"/>
+          </a:p>
+        </p:txBody>
+      </p:sp>
+      <p:sp>
+        <p:nvSpPr>
+          <p:cNvPr id="11" name="Tijdelijke aanduiding voor inhoud 2">
+            <a:extLst>
+              <a:ext uri="{FF2B5EF4-FFF2-40B4-BE49-F238E27FC236}">
+                <a16:creationId xmlns:a16="http://schemas.microsoft.com/office/drawing/2014/main" id="{40F85C12-A3E7-46ED-F685-C8F0C7874057}"/>
+              </a:ext>
+            </a:extLst>
+          </p:cNvPr>
+          <p:cNvSpPr txBox="1">
+            <a:spLocks/>
+          </p:cNvSpPr>
+          <p:nvPr/>
+        </p:nvSpPr>
+        <p:spPr>
+          <a:xfrm>
+            <a:off x="6194427" y="2263816"/>
+            <a:ext cx="5421575" cy="3837658"/>
+          </a:xfrm>
+          <a:prstGeom prst="rect">
+            <a:avLst/>
+          </a:prstGeom>
+          <a:solidFill>
+            <a:schemeClr val="accent6">
+              <a:lumMod val="20000"/>
+              <a:lumOff val="80000"/>
+            </a:schemeClr>
+          </a:solidFill>
+          <a:ln w="9525">
+            <a:solidFill>
+              <a:schemeClr val="accent1"/>
+            </a:solidFill>
+          </a:ln>
+        </p:spPr>
+        <p:txBody>
+          <a:bodyPr vert="horz" lIns="91440" tIns="45720" rIns="91440" bIns="45720" rtlCol="0">
+            <a:normAutofit fontScale="55000" lnSpcReduction="20000"/>
+          </a:bodyPr>
+          <a:lstStyle>
+            <a:lvl1pPr marL="228600" indent="-228600" algn="l" defTabSz="914400" rtl="0" eaLnBrk="1" latinLnBrk="0" hangingPunct="1">
+              <a:lnSpc>
+                <a:spcPct val="100000"/>
+              </a:lnSpc>
+              <a:spcBef>
+                <a:spcPts val="1000"/>
+              </a:spcBef>
+              <a:buFont typeface="Arial"/>
+              <a:buChar char="•"/>
+              <a:defRPr sz="2400" kern="1200" baseline="0">
+                <a:solidFill>
+                  <a:schemeClr val="tx1"/>
+                </a:solidFill>
+                <a:latin typeface="Arial" charset="0"/>
+                <a:ea typeface="+mn-ea"/>
+                <a:cs typeface="+mn-cs"/>
+              </a:defRPr>
+            </a:lvl1pPr>
+            <a:lvl2pPr marL="685800" indent="-228600" algn="l" defTabSz="914400" rtl="0" eaLnBrk="1" latinLnBrk="0" hangingPunct="1">
+              <a:lnSpc>
+                <a:spcPct val="100000"/>
+              </a:lnSpc>
+              <a:spcBef>
+                <a:spcPts val="500"/>
+              </a:spcBef>
+              <a:buFont typeface="Arial"/>
+              <a:buChar char="•"/>
+              <a:defRPr sz="2400" kern="1200" baseline="0">
+                <a:solidFill>
+                  <a:schemeClr val="tx1"/>
+                </a:solidFill>
+                <a:latin typeface="Arial" charset="0"/>
+                <a:ea typeface="+mn-ea"/>
+                <a:cs typeface="+mn-cs"/>
+              </a:defRPr>
+            </a:lvl2pPr>
+            <a:lvl3pPr marL="1143000" indent="-228600" algn="l" defTabSz="914400" rtl="0" eaLnBrk="1" latinLnBrk="0" hangingPunct="1">
+              <a:lnSpc>
+                <a:spcPct val="100000"/>
+              </a:lnSpc>
+              <a:spcBef>
+                <a:spcPts val="500"/>
+              </a:spcBef>
+              <a:buFont typeface="Arial"/>
+              <a:buChar char="•"/>
+              <a:defRPr sz="2000" kern="1200" baseline="0">
+                <a:solidFill>
+                  <a:schemeClr val="tx1"/>
+                </a:solidFill>
+                <a:latin typeface="Arial" charset="0"/>
+                <a:ea typeface="+mn-ea"/>
+                <a:cs typeface="+mn-cs"/>
+              </a:defRPr>
+            </a:lvl3pPr>
+            <a:lvl4pPr marL="1600200" indent="-228600" algn="l" defTabSz="914400" rtl="0" eaLnBrk="1" latinLnBrk="0" hangingPunct="1">
+              <a:lnSpc>
+                <a:spcPct val="100000"/>
+              </a:lnSpc>
+              <a:spcBef>
+                <a:spcPts val="500"/>
+              </a:spcBef>
+              <a:buFont typeface="Arial"/>
+              <a:buChar char="•"/>
+              <a:defRPr sz="1800" kern="1200" baseline="0">
+                <a:solidFill>
+                  <a:schemeClr val="tx1"/>
+                </a:solidFill>
+                <a:latin typeface="Arial" charset="0"/>
+                <a:ea typeface="+mn-ea"/>
+                <a:cs typeface="+mn-cs"/>
+              </a:defRPr>
+            </a:lvl4pPr>
+            <a:lvl5pPr marL="2057400" indent="-228600" algn="l" defTabSz="914400" rtl="0" eaLnBrk="1" latinLnBrk="0" hangingPunct="1">
+              <a:lnSpc>
+                <a:spcPct val="100000"/>
+              </a:lnSpc>
+              <a:spcBef>
+                <a:spcPts val="500"/>
+              </a:spcBef>
+              <a:buFont typeface="Arial"/>
+              <a:buChar char="•"/>
+              <a:defRPr sz="1800" kern="1200" baseline="0">
+                <a:solidFill>
+                  <a:schemeClr val="tx1"/>
+                </a:solidFill>
+                <a:latin typeface="Arial" charset="0"/>
+                <a:ea typeface="+mn-ea"/>
+                <a:cs typeface="+mn-cs"/>
+              </a:defRPr>
+            </a:lvl5pPr>
+            <a:lvl6pPr marL="2514600" indent="-228600" algn="l" defTabSz="914400" rtl="0" eaLnBrk="1" latinLnBrk="0" hangingPunct="1">
+              <a:lnSpc>
+                <a:spcPct val="90000"/>
+              </a:lnSpc>
+              <a:spcBef>
+                <a:spcPts val="500"/>
+              </a:spcBef>
+              <a:buFont typeface="Arial"/>
+              <a:buChar char="•"/>
+              <a:defRPr sz="1800" kern="1200">
+                <a:solidFill>
+                  <a:schemeClr val="tx1"/>
+                </a:solidFill>
+                <a:latin typeface="+mn-lt"/>
+                <a:ea typeface="+mn-ea"/>
+                <a:cs typeface="+mn-cs"/>
+              </a:defRPr>
+            </a:lvl6pPr>
+            <a:lvl7pPr marL="2971800" indent="-228600" algn="l" defTabSz="914400" rtl="0" eaLnBrk="1" latinLnBrk="0" hangingPunct="1">
+              <a:lnSpc>
+                <a:spcPct val="90000"/>
+              </a:lnSpc>
+              <a:spcBef>
+                <a:spcPts val="500"/>
+              </a:spcBef>
+              <a:buFont typeface="Arial"/>
+              <a:buChar char="•"/>
+              <a:defRPr sz="1800" kern="1200">
+                <a:solidFill>
+                  <a:schemeClr val="tx1"/>
+                </a:solidFill>
+                <a:latin typeface="+mn-lt"/>
+                <a:ea typeface="+mn-ea"/>
+                <a:cs typeface="+mn-cs"/>
+              </a:defRPr>
+            </a:lvl7pPr>
+            <a:lvl8pPr marL="3429000" indent="-228600" algn="l" defTabSz="914400" rtl="0" eaLnBrk="1" latinLnBrk="0" hangingPunct="1">
+              <a:lnSpc>
+                <a:spcPct val="90000"/>
+              </a:lnSpc>
+              <a:spcBef>
+                <a:spcPts val="500"/>
+              </a:spcBef>
+              <a:buFont typeface="Arial"/>
+              <a:buChar char="•"/>
+              <a:defRPr sz="1800" kern="1200">
+                <a:solidFill>
+                  <a:schemeClr val="tx1"/>
+                </a:solidFill>
+                <a:latin typeface="+mn-lt"/>
+                <a:ea typeface="+mn-ea"/>
+                <a:cs typeface="+mn-cs"/>
+              </a:defRPr>
+            </a:lvl8pPr>
+            <a:lvl9pPr marL="3886200" indent="-228600" algn="l" defTabSz="914400" rtl="0" eaLnBrk="1" latinLnBrk="0" hangingPunct="1">
+              <a:lnSpc>
+                <a:spcPct val="90000"/>
+              </a:lnSpc>
+              <a:spcBef>
+                <a:spcPts val="500"/>
+              </a:spcBef>
+              <a:buFont typeface="Arial"/>
+              <a:buChar char="•"/>
+              <a:defRPr sz="1800" kern="1200">
+                <a:solidFill>
+                  <a:schemeClr val="tx1"/>
+                </a:solidFill>
+                <a:latin typeface="+mn-lt"/>
+                <a:ea typeface="+mn-ea"/>
+                <a:cs typeface="+mn-cs"/>
+              </a:defRPr>
+            </a:lvl9pPr>
+          </a:lstStyle>
+          <a:p>
+            <a:pPr marL="0" indent="0">
+              <a:lnSpc>
+                <a:spcPct val="120000"/>
+              </a:lnSpc>
+              <a:buFont typeface="Arial"/>
+              <a:buNone/>
+            </a:pPr>
+            <a:br>
+              <a:rPr lang="en-US" dirty="0"/>
+            </a:br>
+            <a:r>
+              <a:rPr lang="en-US" dirty="0"/>
+              <a:t>[Post-Chorus]</a:t>
+            </a:r>
+            <a:br>
+              <a:rPr lang="en-US" dirty="0"/>
+            </a:br>
+            <a:r>
+              <a:rPr lang="en-US" dirty="0"/>
+              <a:t>I've got</a:t>
+            </a:r>
+            <a:br>
+              <a:rPr lang="en-US" dirty="0"/>
+            </a:br>
+            <a:r>
+              <a:rPr lang="en-US" dirty="0"/>
+              <a:t>a lot to say to you</a:t>
+            </a:r>
+            <a:br>
+              <a:rPr lang="en-US" dirty="0"/>
+            </a:br>
+            <a:r>
+              <a:rPr lang="en-US" dirty="0"/>
+              <a:t>But I</a:t>
+            </a:r>
+            <a:br>
+              <a:rPr lang="en-US" dirty="0"/>
+            </a:br>
+            <a:r>
+              <a:rPr lang="en-US" dirty="0"/>
+              <a:t>can't say it</a:t>
+            </a:r>
+          </a:p>
+          <a:p>
+            <a:pPr marL="0" indent="0">
+              <a:lnSpc>
+                <a:spcPct val="120000"/>
+              </a:lnSpc>
+              <a:buFont typeface="Arial"/>
+              <a:buNone/>
+            </a:pPr>
+            <a:r>
+              <a:rPr lang="en-US" dirty="0"/>
+              <a:t>[Bridge]</a:t>
+            </a:r>
+            <a:br>
+              <a:rPr lang="en-US" dirty="0"/>
+            </a:br>
+            <a:r>
+              <a:rPr lang="en-US" dirty="0"/>
+              <a:t>Because I don't know</a:t>
+            </a:r>
+            <a:br>
+              <a:rPr lang="en-US" dirty="0"/>
+            </a:br>
+            <a:r>
+              <a:rPr lang="en-US" dirty="0"/>
+              <a:t>What you're </a:t>
+            </a:r>
+            <a:r>
+              <a:rPr lang="en-US" dirty="0" err="1"/>
+              <a:t>thinkin</a:t>
+            </a:r>
+            <a:r>
+              <a:rPr lang="en-US" dirty="0"/>
+              <a:t>', but</a:t>
+            </a:r>
+            <a:br>
+              <a:rPr lang="en-US" dirty="0"/>
+            </a:br>
+            <a:r>
+              <a:rPr lang="en-US" dirty="0"/>
+              <a:t>It's not like I'm </a:t>
+            </a:r>
+            <a:r>
+              <a:rPr lang="en-US" dirty="0" err="1"/>
+              <a:t>talkin</a:t>
+            </a:r>
+            <a:r>
+              <a:rPr lang="en-US" dirty="0"/>
+              <a:t>'. I can</a:t>
+            </a:r>
+            <a:br>
+              <a:rPr lang="en-US" dirty="0"/>
+            </a:br>
+            <a:r>
+              <a:rPr lang="en-US" dirty="0"/>
+              <a:t>tell you that I love you and</a:t>
+            </a:r>
+            <a:br>
+              <a:rPr lang="en-US" dirty="0"/>
+            </a:br>
+            <a:r>
+              <a:rPr lang="en-US" dirty="0"/>
+              <a:t>You're my best friend but I just can’t</a:t>
+            </a:r>
+            <a:br>
+              <a:rPr lang="en-US" dirty="0"/>
+            </a:br>
+            <a:r>
+              <a:rPr lang="en-US" dirty="0"/>
+              <a:t>Say it because I</a:t>
+            </a:r>
+            <a:br>
+              <a:rPr lang="en-US" dirty="0"/>
+            </a:br>
+            <a:r>
+              <a:rPr lang="en-US" dirty="0"/>
+              <a:t>don't want to hurt your feelings</a:t>
+            </a:r>
+            <a:br>
+              <a:rPr lang="en-US" dirty="0"/>
+            </a:br>
+            <a:r>
+              <a:rPr lang="en-US" dirty="0"/>
+              <a:t>Or make you feel bad for me</a:t>
+            </a:r>
+            <a:br>
+              <a:rPr lang="en-US" dirty="0"/>
+            </a:br>
+            <a:r>
+              <a:rPr lang="en-US" dirty="0"/>
+              <a:t>So I'll just tell you what I really</a:t>
+            </a:r>
+            <a:br>
+              <a:rPr lang="en-US" dirty="0"/>
+            </a:br>
+            <a:r>
+              <a:rPr lang="en-US" dirty="0"/>
+              <a:t>Want to do to make it up to </a:t>
+            </a:r>
+            <a:r>
+              <a:rPr lang="en-US" dirty="0" err="1"/>
+              <a:t>ya</a:t>
+            </a:r>
+            <a:r>
+              <a:rPr lang="en-US" dirty="0"/>
+              <a:t> (I want</a:t>
+            </a:r>
+          </a:p>
+        </p:txBody>
+      </p:sp>
+    </p:spTree>
+    <p:extLst>
+      <p:ext uri="{BB962C8B-B14F-4D97-AF65-F5344CB8AC3E}">
+        <p14:creationId xmlns:p14="http://schemas.microsoft.com/office/powerpoint/2010/main" val="597342398"/>
+      </p:ext>
+    </p:extLst>
+  </p:cSld>
+  <p:clrMapOvr>
+    <a:masterClrMapping/>
+  </p:clrMapOvr>
+</p:sld>
+</file>
+
+<file path=ppt/slides/slide14.xml><?xml version="1.0" encoding="utf-8"?>
+<p:sld xmlns:a="http://schemas.openxmlformats.org/drawingml/2006/main" xmlns:r="http://schemas.openxmlformats.org/officeDocument/2006/relationships" xmlns:p="http://schemas.openxmlformats.org/presentationml/2006/main">
+  <p:cSld>
+    <p:spTree>
+      <p:nvGrpSpPr>
+        <p:cNvPr id="1" name=""/>
+        <p:cNvGrpSpPr/>
+        <p:nvPr/>
+      </p:nvGrpSpPr>
+      <p:grpSpPr>
+        <a:xfrm>
+          <a:off x="0" y="0"/>
+          <a:ext cx="0" cy="0"/>
+          <a:chOff x="0" y="0"/>
+          <a:chExt cx="0" cy="0"/>
+        </a:xfrm>
+      </p:grpSpPr>
+      <p:sp>
+        <p:nvSpPr>
+          <p:cNvPr id="2" name="Tijdelijke aanduiding voor inhoud 1">
+            <a:extLst>
+              <a:ext uri="{FF2B5EF4-FFF2-40B4-BE49-F238E27FC236}">
+                <a16:creationId xmlns:a16="http://schemas.microsoft.com/office/drawing/2014/main" id="{9372DB2E-EA25-5B36-4E6C-183340ECB92A}"/>
+              </a:ext>
+            </a:extLst>
+          </p:cNvPr>
+          <p:cNvSpPr>
+            <a:spLocks noGrp="1"/>
+          </p:cNvSpPr>
+          <p:nvPr>
+            <p:ph idx="1"/>
+          </p:nvPr>
+        </p:nvSpPr>
+        <p:spPr/>
+        <p:txBody>
+          <a:bodyPr/>
+          <a:lstStyle/>
+          <a:p>
+            <a:r>
+              <a:rPr lang="nl-NL" dirty="0"/>
+              <a:t>Oplossing 1: </a:t>
+            </a:r>
+          </a:p>
+          <a:p>
+            <a:pPr lvl="1"/>
+            <a:r>
+              <a:rPr lang="nl-NL" dirty="0"/>
+              <a:t>53/58 lijnen </a:t>
+            </a:r>
+            <a:r>
+              <a:rPr lang="nl-NL" dirty="0">
+                <a:sym typeface="Wingdings" pitchFamily="2" charset="2"/>
+              </a:rPr>
+              <a:t> correct # lettergrepen, andere hadden één te veel/weinig</a:t>
+            </a:r>
+          </a:p>
+          <a:p>
+            <a:pPr lvl="2"/>
+            <a:r>
+              <a:rPr lang="nl-NL" dirty="0">
+                <a:sym typeface="Wingdings" pitchFamily="2" charset="2"/>
+              </a:rPr>
+              <a:t>= 0.09 lettergreep gemiddeld verschil</a:t>
+            </a:r>
+          </a:p>
+          <a:p>
+            <a:pPr lvl="1"/>
+            <a:r>
+              <a:rPr lang="nl-NL" dirty="0">
+                <a:sym typeface="Wingdings" pitchFamily="2" charset="2"/>
+              </a:rPr>
+              <a:t>Onderwerp van parodie weinig aangeraakt</a:t>
+            </a:r>
+          </a:p>
+          <a:p>
+            <a:pPr lvl="1"/>
+            <a:r>
+              <a:rPr lang="nl-NL" dirty="0"/>
+              <a:t>Vaak niet complete verse</a:t>
+            </a:r>
+          </a:p>
+          <a:p>
+            <a:r>
+              <a:rPr lang="nl-NL" dirty="0"/>
+              <a:t>Oplossing 2:</a:t>
+            </a:r>
+          </a:p>
+          <a:p>
+            <a:pPr lvl="1"/>
+            <a:r>
+              <a:rPr lang="nl-NL" dirty="0"/>
+              <a:t>14/14 lijnen </a:t>
+            </a:r>
+            <a:r>
+              <a:rPr lang="nl-NL" dirty="0">
+                <a:sym typeface="Wingdings" pitchFamily="2" charset="2"/>
+              </a:rPr>
+              <a:t> correct # lettergrepen</a:t>
+            </a:r>
+          </a:p>
+          <a:p>
+            <a:pPr lvl="1"/>
+            <a:r>
+              <a:rPr lang="nl-NL" dirty="0">
+                <a:sym typeface="Wingdings" pitchFamily="2" charset="2"/>
+              </a:rPr>
+              <a:t>Onderwerp niet aangehaald</a:t>
+            </a:r>
+          </a:p>
+          <a:p>
+            <a:pPr lvl="1"/>
+            <a:r>
+              <a:rPr lang="nl-NL" dirty="0">
+                <a:sym typeface="Wingdings" pitchFamily="2" charset="2"/>
+              </a:rPr>
+              <a:t>Veel groter memory gebruik</a:t>
+            </a:r>
+          </a:p>
+        </p:txBody>
+      </p:sp>
+      <p:sp>
+        <p:nvSpPr>
+          <p:cNvPr id="3" name="Tijdelijke aanduiding voor voettekst 2">
+            <a:extLst>
+              <a:ext uri="{FF2B5EF4-FFF2-40B4-BE49-F238E27FC236}">
+                <a16:creationId xmlns:a16="http://schemas.microsoft.com/office/drawing/2014/main" id="{C0F4F8FE-47FC-A3C5-75C6-6AE81BD4F124}"/>
+              </a:ext>
+            </a:extLst>
+          </p:cNvPr>
+          <p:cNvSpPr>
+            <a:spLocks noGrp="1"/>
+          </p:cNvSpPr>
+          <p:nvPr>
+            <p:ph type="ftr" sz="quarter" idx="11"/>
+          </p:nvPr>
+        </p:nvSpPr>
+        <p:spPr/>
+        <p:txBody>
+          <a:bodyPr/>
+          <a:lstStyle/>
+          <a:p>
+            <a:r>
+              <a:rPr lang="nl-NL"/>
+              <a:t>Computerwetenschappen - DTAI</a:t>
+            </a:r>
+            <a:endParaRPr lang="nl-NL" dirty="0"/>
+          </a:p>
+        </p:txBody>
+      </p:sp>
+      <p:sp>
+        <p:nvSpPr>
+          <p:cNvPr id="4" name="Tijdelijke aanduiding voor dianummer 3">
+            <a:extLst>
+              <a:ext uri="{FF2B5EF4-FFF2-40B4-BE49-F238E27FC236}">
+                <a16:creationId xmlns:a16="http://schemas.microsoft.com/office/drawing/2014/main" id="{EA50CBBC-3470-588F-CB5A-56287533C523}"/>
+              </a:ext>
+            </a:extLst>
+          </p:cNvPr>
+          <p:cNvSpPr>
+            <a:spLocks noGrp="1"/>
+          </p:cNvSpPr>
+          <p:nvPr>
+            <p:ph type="sldNum" sz="quarter" idx="12"/>
+          </p:nvPr>
+        </p:nvSpPr>
+        <p:spPr/>
+        <p:txBody>
+          <a:bodyPr/>
+          <a:lstStyle/>
+          <a:p>
+            <a:fld id="{0A297500-7527-634B-90F4-69D0994C32B4}" type="slidenum">
+              <a:rPr lang="nl-NL" smtClean="0"/>
+              <a:t>14</a:t>
+            </a:fld>
+            <a:endParaRPr lang="nl-NL" dirty="0"/>
+          </a:p>
+        </p:txBody>
+      </p:sp>
+      <p:sp>
+        <p:nvSpPr>
+          <p:cNvPr id="5" name="Titel 4">
+            <a:extLst>
+              <a:ext uri="{FF2B5EF4-FFF2-40B4-BE49-F238E27FC236}">
+                <a16:creationId xmlns:a16="http://schemas.microsoft.com/office/drawing/2014/main" id="{9C39ED6A-D22B-E591-4BD8-56E830AD2BD1}"/>
+              </a:ext>
+            </a:extLst>
+          </p:cNvPr>
+          <p:cNvSpPr>
+            <a:spLocks noGrp="1"/>
+          </p:cNvSpPr>
+          <p:nvPr>
+            <p:ph type="title"/>
+          </p:nvPr>
+        </p:nvSpPr>
+        <p:spPr/>
+        <p:txBody>
+          <a:bodyPr>
+            <a:normAutofit fontScale="90000"/>
+          </a:bodyPr>
+          <a:lstStyle/>
+          <a:p>
+            <a:r>
+              <a:rPr lang="nl-NL" b="1" dirty="0"/>
+              <a:t>Huidig onderzoek: </a:t>
+            </a:r>
+            <a:r>
+              <a:rPr lang="nl-NL" dirty="0" err="1"/>
+              <a:t>Syllable</a:t>
+            </a:r>
+            <a:r>
+              <a:rPr lang="nl-NL" dirty="0"/>
+              <a:t> </a:t>
+            </a:r>
+            <a:r>
+              <a:rPr lang="nl-NL" dirty="0" err="1"/>
+              <a:t>Constraint</a:t>
+            </a:r>
+            <a:r>
+              <a:rPr lang="nl-NL" dirty="0"/>
+              <a:t> | Discussie</a:t>
+            </a:r>
+            <a:endParaRPr lang="en-US" dirty="0"/>
+          </a:p>
+        </p:txBody>
+      </p:sp>
+    </p:spTree>
+    <p:extLst>
+      <p:ext uri="{BB962C8B-B14F-4D97-AF65-F5344CB8AC3E}">
+        <p14:creationId xmlns:p14="http://schemas.microsoft.com/office/powerpoint/2010/main" val="1891570257"/>
+      </p:ext>
+    </p:extLst>
+  </p:cSld>
+  <p:clrMapOvr>
+    <a:masterClrMapping/>
+  </p:clrMapOvr>
+</p:sld>
+</file>
+
+<file path=ppt/slides/slide15.xml><?xml version="1.0" encoding="utf-8"?>
+<p:sld xmlns:a="http://schemas.openxmlformats.org/drawingml/2006/main" xmlns:r="http://schemas.openxmlformats.org/officeDocument/2006/relationships" xmlns:p="http://schemas.openxmlformats.org/presentationml/2006/main">
+  <p:cSld>
+    <p:spTree>
+      <p:nvGrpSpPr>
+        <p:cNvPr id="1" name=""/>
+        <p:cNvGrpSpPr/>
+        <p:nvPr/>
+      </p:nvGrpSpPr>
+      <p:grpSpPr>
+        <a:xfrm>
+          <a:off x="0" y="0"/>
+          <a:ext cx="0" cy="0"/>
+          <a:chOff x="0" y="0"/>
+          <a:chExt cx="0" cy="0"/>
+        </a:xfrm>
+      </p:grpSpPr>
+      <p:sp>
+        <p:nvSpPr>
+          <p:cNvPr id="2" name="Tijdelijke aanduiding voor voettekst 1">
+            <a:extLst>
+              <a:ext uri="{FF2B5EF4-FFF2-40B4-BE49-F238E27FC236}">
+                <a16:creationId xmlns:a16="http://schemas.microsoft.com/office/drawing/2014/main" id="{0FF7A986-C092-BFE7-596C-1051E75E8DC4}"/>
+              </a:ext>
+            </a:extLst>
+          </p:cNvPr>
+          <p:cNvSpPr>
+            <a:spLocks noGrp="1"/>
+          </p:cNvSpPr>
+          <p:nvPr>
+            <p:ph type="ftr" sz="quarter" idx="11"/>
+          </p:nvPr>
+        </p:nvSpPr>
+        <p:spPr/>
+        <p:txBody>
+          <a:bodyPr/>
+          <a:lstStyle/>
+          <a:p>
+            <a:r>
+              <a:rPr lang="nl-NL"/>
+              <a:t>Computerwetenschappen - DTAI</a:t>
+            </a:r>
+          </a:p>
+        </p:txBody>
+      </p:sp>
+      <p:sp>
+        <p:nvSpPr>
+          <p:cNvPr id="3" name="Tijdelijke aanduiding voor dianummer 2">
+            <a:extLst>
+              <a:ext uri="{FF2B5EF4-FFF2-40B4-BE49-F238E27FC236}">
+                <a16:creationId xmlns:a16="http://schemas.microsoft.com/office/drawing/2014/main" id="{3AEAB7DB-BFCA-8E16-331A-DFF48B8F272A}"/>
+              </a:ext>
+            </a:extLst>
+          </p:cNvPr>
+          <p:cNvSpPr>
+            <a:spLocks noGrp="1"/>
+          </p:cNvSpPr>
+          <p:nvPr>
+            <p:ph type="sldNum" sz="quarter" idx="12"/>
+          </p:nvPr>
+        </p:nvSpPr>
+        <p:spPr/>
+        <p:txBody>
+          <a:bodyPr/>
+          <a:lstStyle/>
+          <a:p>
+            <a:fld id="{0A297500-7527-634B-90F4-69D0994C32B4}" type="slidenum">
+              <a:rPr lang="nl-NL" smtClean="0"/>
+              <a:t>15</a:t>
+            </a:fld>
+            <a:endParaRPr lang="nl-NL"/>
+          </a:p>
+        </p:txBody>
+      </p:sp>
+      <p:sp>
+        <p:nvSpPr>
+          <p:cNvPr id="4" name="Tijdelijke aanduiding voor inhoud 3">
+            <a:extLst>
+              <a:ext uri="{FF2B5EF4-FFF2-40B4-BE49-F238E27FC236}">
+                <a16:creationId xmlns:a16="http://schemas.microsoft.com/office/drawing/2014/main" id="{261B1904-7BC3-9542-2E79-497F5C35544C}"/>
+              </a:ext>
+            </a:extLst>
+          </p:cNvPr>
+          <p:cNvSpPr>
+            <a:spLocks noGrp="1"/>
+          </p:cNvSpPr>
+          <p:nvPr>
+            <p:ph idx="1"/>
+          </p:nvPr>
+        </p:nvSpPr>
+        <p:spPr/>
+        <p:txBody>
+          <a:bodyPr>
+            <a:normAutofit fontScale="92500"/>
+          </a:bodyPr>
+          <a:lstStyle/>
+          <a:p>
+            <a:r>
+              <a:rPr lang="nl-BE" sz="1800" b="1" dirty="0"/>
+              <a:t>January:</a:t>
+            </a:r>
+            <a:endParaRPr lang="nl-BE" sz="1800" dirty="0"/>
+          </a:p>
+          <a:p>
+            <a:pPr lvl="1">
+              <a:buFont typeface="Arial" panose="020B0604020202020204" pitchFamily="34" charset="0"/>
+              <a:buChar char="•"/>
+            </a:pPr>
+            <a:r>
+              <a:rPr lang="nl-BE" sz="1800" dirty="0"/>
+              <a:t>Introduction + Literature Review written</a:t>
+            </a:r>
+          </a:p>
+          <a:p>
+            <a:pPr lvl="1">
+              <a:buFont typeface="Arial" panose="020B0604020202020204" pitchFamily="34" charset="0"/>
+              <a:buChar char="•"/>
+            </a:pPr>
+            <a:r>
+              <a:rPr lang="nl-BE" sz="1800" dirty="0"/>
+              <a:t>Test the different Open Source models (also chat vs non-chat verison)</a:t>
+            </a:r>
+          </a:p>
+          <a:p>
+            <a:pPr lvl="1">
+              <a:buFont typeface="Arial" panose="020B0604020202020204" pitchFamily="34" charset="0"/>
+              <a:buChar char="•"/>
+            </a:pPr>
+            <a:r>
+              <a:rPr lang="nl-BE" sz="1800" dirty="0"/>
+              <a:t>Look into mathematical sides of the constraints</a:t>
+            </a:r>
+          </a:p>
+          <a:p>
+            <a:pPr lvl="1">
+              <a:buFont typeface="Arial" panose="020B0604020202020204" pitchFamily="34" charset="0"/>
+              <a:buChar char="•"/>
+            </a:pPr>
+            <a:r>
+              <a:rPr lang="nl-BE" sz="1800" dirty="0"/>
+              <a:t>Improve syllable constraint</a:t>
+            </a:r>
+          </a:p>
+          <a:p>
+            <a:pPr lvl="1">
+              <a:buFont typeface="Arial" panose="020B0604020202020204" pitchFamily="34" charset="0"/>
+              <a:buChar char="•"/>
+            </a:pPr>
+            <a:r>
+              <a:rPr lang="nl-BE" sz="1800" dirty="0"/>
+              <a:t>Look into Rhyming Constraint</a:t>
+            </a:r>
+          </a:p>
+          <a:p>
+            <a:r>
+              <a:rPr lang="nl-BE" sz="1800" b="1" dirty="0"/>
+              <a:t>February:</a:t>
+            </a:r>
+            <a:endParaRPr lang="nl-BE" sz="1800" dirty="0"/>
+          </a:p>
+          <a:p>
+            <a:pPr lvl="1">
+              <a:buFont typeface="Arial" panose="020B0604020202020204" pitchFamily="34" charset="0"/>
+              <a:buChar char="•"/>
+            </a:pPr>
+            <a:r>
+              <a:rPr lang="nl-BE" sz="1800" dirty="0"/>
+              <a:t>Finish Rhyming Constraint</a:t>
+            </a:r>
+          </a:p>
+          <a:p>
+            <a:pPr lvl="1">
+              <a:buFont typeface="Arial" panose="020B0604020202020204" pitchFamily="34" charset="0"/>
+              <a:buChar char="•"/>
+            </a:pPr>
+            <a:r>
+              <a:rPr lang="nl-BE" sz="1800" dirty="0"/>
+              <a:t>Enforce POS-tag</a:t>
+            </a:r>
+          </a:p>
+          <a:p>
+            <a:pPr lvl="1">
+              <a:buFont typeface="Arial" panose="020B0604020202020204" pitchFamily="34" charset="0"/>
+              <a:buChar char="•"/>
+            </a:pPr>
+            <a:r>
+              <a:rPr lang="nl-BE" sz="1800" dirty="0"/>
+              <a:t>Start preparing human survey to test the generated parodies from the different models</a:t>
+            </a:r>
+          </a:p>
+          <a:p>
+            <a:pPr lvl="1">
+              <a:buFont typeface="Arial" panose="020B0604020202020204" pitchFamily="34" charset="0"/>
+              <a:buChar char="•"/>
+            </a:pPr>
+            <a:r>
+              <a:rPr lang="nl-BE" sz="1800" dirty="0"/>
+              <a:t>Train some of the best models with lyrics, parodies and humor text</a:t>
+            </a:r>
+          </a:p>
+          <a:p>
+            <a:pPr lvl="1"/>
+            <a:endParaRPr lang="nl-NL" sz="1800" dirty="0"/>
+          </a:p>
+          <a:p>
+            <a:pPr lvl="1"/>
+            <a:endParaRPr lang="nl-NL" sz="1800" dirty="0"/>
+          </a:p>
+        </p:txBody>
+      </p:sp>
+      <p:sp>
+        <p:nvSpPr>
+          <p:cNvPr id="5" name="Tijdelijke aanduiding voor inhoud 4">
+            <a:extLst>
+              <a:ext uri="{FF2B5EF4-FFF2-40B4-BE49-F238E27FC236}">
+                <a16:creationId xmlns:a16="http://schemas.microsoft.com/office/drawing/2014/main" id="{3A3EA626-5665-AB09-A59C-C86A0175DEDC}"/>
+              </a:ext>
+            </a:extLst>
+          </p:cNvPr>
+          <p:cNvSpPr>
+            <a:spLocks noGrp="1"/>
+          </p:cNvSpPr>
+          <p:nvPr>
+            <p:ph sz="quarter" idx="13"/>
+          </p:nvPr>
+        </p:nvSpPr>
+        <p:spPr/>
+        <p:txBody>
+          <a:bodyPr>
+            <a:normAutofit fontScale="92500" lnSpcReduction="20000"/>
+          </a:bodyPr>
+          <a:lstStyle/>
+          <a:p>
+            <a:r>
+              <a:rPr lang="nl-BE" sz="1800" b="1" dirty="0"/>
+              <a:t>March:</a:t>
+            </a:r>
+            <a:endParaRPr lang="nl-BE" sz="1800" dirty="0"/>
+          </a:p>
+          <a:p>
+            <a:pPr lvl="1">
+              <a:buFont typeface="Arial" panose="020B0604020202020204" pitchFamily="34" charset="0"/>
+              <a:buChar char="•"/>
+            </a:pPr>
+            <a:r>
+              <a:rPr lang="nl-BE" sz="1800" dirty="0"/>
+              <a:t>Create stream-lined algorithm and create interface to be able to more easily use it</a:t>
+            </a:r>
+          </a:p>
+          <a:p>
+            <a:pPr lvl="1">
+              <a:buFont typeface="Arial" panose="020B0604020202020204" pitchFamily="34" charset="0"/>
+              <a:buChar char="•"/>
+            </a:pPr>
+            <a:r>
+              <a:rPr lang="nl-BE" sz="1800" dirty="0"/>
+              <a:t>Finish any last experiments that still need to be done</a:t>
+            </a:r>
+          </a:p>
+          <a:p>
+            <a:pPr lvl="1">
+              <a:buFont typeface="Arial" panose="020B0604020202020204" pitchFamily="34" charset="0"/>
+              <a:buChar char="•"/>
+            </a:pPr>
+            <a:r>
+              <a:rPr lang="nl-BE" sz="1800" dirty="0"/>
+              <a:t>Finish and launch survey</a:t>
+            </a:r>
+          </a:p>
+          <a:p>
+            <a:pPr lvl="1">
+              <a:buFont typeface="Arial" panose="020B0604020202020204" pitchFamily="34" charset="0"/>
+              <a:buChar char="•"/>
+            </a:pPr>
+            <a:r>
+              <a:rPr lang="nl-BE" sz="1800" dirty="0"/>
+              <a:t>Prepare Third and final intermediate presentation</a:t>
+            </a:r>
+          </a:p>
+          <a:p>
+            <a:r>
+              <a:rPr lang="nl-BE" sz="1800" b="1" dirty="0"/>
+              <a:t>April:</a:t>
+            </a:r>
+            <a:endParaRPr lang="nl-BE" sz="1800" dirty="0"/>
+          </a:p>
+          <a:p>
+            <a:pPr lvl="1">
+              <a:buFont typeface="Arial" panose="020B0604020202020204" pitchFamily="34" charset="0"/>
+              <a:buChar char="•"/>
+            </a:pPr>
+            <a:r>
+              <a:rPr lang="nl-BE" sz="1800" dirty="0"/>
+              <a:t>Evaluate and process results from survey</a:t>
+            </a:r>
+          </a:p>
+          <a:p>
+            <a:pPr lvl="1">
+              <a:buFont typeface="Arial" panose="020B0604020202020204" pitchFamily="34" charset="0"/>
+              <a:buChar char="•"/>
+            </a:pPr>
+            <a:r>
+              <a:rPr lang="nl-BE" sz="1800" dirty="0"/>
+              <a:t>Finish last experiments</a:t>
+            </a:r>
+          </a:p>
+          <a:p>
+            <a:pPr lvl="1">
+              <a:buFont typeface="Arial" panose="020B0604020202020204" pitchFamily="34" charset="0"/>
+              <a:buChar char="•"/>
+            </a:pPr>
+            <a:r>
+              <a:rPr lang="nl-BE" sz="1800" dirty="0"/>
+              <a:t>Complete final algorithm and clean up code</a:t>
+            </a:r>
+          </a:p>
+          <a:p>
+            <a:pPr lvl="1">
+              <a:buFont typeface="Arial" panose="020B0604020202020204" pitchFamily="34" charset="0"/>
+              <a:buChar char="•"/>
+            </a:pPr>
+            <a:r>
+              <a:rPr lang="nl-BE" sz="1800" dirty="0"/>
+              <a:t>Start writing thesis</a:t>
+            </a:r>
+          </a:p>
+          <a:p>
+            <a:pPr lvl="1">
+              <a:buFont typeface="Arial" panose="020B0604020202020204" pitchFamily="34" charset="0"/>
+              <a:buChar char="•"/>
+            </a:pPr>
+            <a:r>
+              <a:rPr lang="nl-BE" sz="1800" dirty="0"/>
+              <a:t>Make poster about thesis</a:t>
+            </a:r>
+          </a:p>
+          <a:p>
+            <a:r>
+              <a:rPr lang="nl-BE" sz="1800" b="1" dirty="0"/>
+              <a:t>May:</a:t>
+            </a:r>
+            <a:endParaRPr lang="nl-BE" sz="1800" dirty="0"/>
+          </a:p>
+          <a:p>
+            <a:pPr lvl="1">
+              <a:buFont typeface="Arial" panose="020B0604020202020204" pitchFamily="34" charset="0"/>
+              <a:buChar char="•"/>
+            </a:pPr>
+            <a:r>
+              <a:rPr lang="nl-BE" sz="1800" dirty="0"/>
+              <a:t>Full focus on writing and finishing thesis</a:t>
+            </a:r>
+          </a:p>
+        </p:txBody>
+      </p:sp>
+      <p:sp>
+        <p:nvSpPr>
+          <p:cNvPr id="6" name="Titel 5">
+            <a:extLst>
+              <a:ext uri="{FF2B5EF4-FFF2-40B4-BE49-F238E27FC236}">
+                <a16:creationId xmlns:a16="http://schemas.microsoft.com/office/drawing/2014/main" id="{6C21229E-8101-C29D-AE9D-A0A36B5EAEF8}"/>
+              </a:ext>
+            </a:extLst>
+          </p:cNvPr>
+          <p:cNvSpPr>
+            <a:spLocks noGrp="1"/>
+          </p:cNvSpPr>
+          <p:nvPr>
+            <p:ph type="title"/>
+          </p:nvPr>
+        </p:nvSpPr>
+        <p:spPr>
+          <a:xfrm>
+            <a:off x="576000" y="162000"/>
+            <a:ext cx="11041200" cy="1152000"/>
+          </a:xfrm>
+        </p:spPr>
+        <p:txBody>
+          <a:bodyPr/>
+          <a:lstStyle/>
+          <a:p>
+            <a:r>
+              <a:rPr lang="nl-NL" dirty="0"/>
+              <a:t>Planning</a:t>
+            </a:r>
+          </a:p>
+        </p:txBody>
+      </p:sp>
+    </p:spTree>
+    <p:extLst>
+      <p:ext uri="{BB962C8B-B14F-4D97-AF65-F5344CB8AC3E}">
+        <p14:creationId xmlns:p14="http://schemas.microsoft.com/office/powerpoint/2010/main" val="1808906806"/>
+      </p:ext>
+    </p:extLst>
+  </p:cSld>
+  <p:clrMapOvr>
+    <a:masterClrMapping/>
+  </p:clrMapOvr>
+</p:sld>
+</file>
+
+<file path=ppt/slides/slide16.xml><?xml version="1.0" encoding="utf-8"?>
+<p:sld xmlns:a="http://schemas.openxmlformats.org/drawingml/2006/main" xmlns:r="http://schemas.openxmlformats.org/officeDocument/2006/relationships" xmlns:p="http://schemas.openxmlformats.org/presentationml/2006/main">
+  <p:cSld>
+    <p:spTree>
+      <p:nvGrpSpPr>
+        <p:cNvPr id="1" name=""/>
+        <p:cNvGrpSpPr/>
+        <p:nvPr/>
+      </p:nvGrpSpPr>
+      <p:grpSpPr>
+        <a:xfrm>
+          <a:off x="0" y="0"/>
+          <a:ext cx="0" cy="0"/>
+          <a:chOff x="0" y="0"/>
+          <a:chExt cx="0" cy="0"/>
+        </a:xfrm>
+      </p:grpSpPr>
+      <p:sp>
+        <p:nvSpPr>
           <p:cNvPr id="2" name="Tijdelijke aanduiding voor voettekst 1">
             <a:extLst>
               <a:ext uri="{FF2B5EF4-FFF2-40B4-BE49-F238E27FC236}">
@@ -5179,7 +7862,7 @@
           <a:p>
             <a:fld id="{0A297500-7527-634B-90F4-69D0994C32B4}" type="slidenum">
               <a:rPr lang="nl-NL" smtClean="0"/>
-              <a:t>10</a:t>
+              <a:t>16</a:t>
             </a:fld>
             <a:endParaRPr lang="nl-NL" dirty="0"/>
           </a:p>
@@ -14237,7 +16920,7 @@
                     <a:lstStyle/>
                     <a:p>
                       <a:r>
-                        <a:rPr lang="nl-BE" sz="900" b="1" cap="none" spc="0">
+                        <a:rPr lang="nl-BE" sz="900" b="1" cap="none" spc="0" dirty="0">
                           <a:solidFill>
                             <a:schemeClr val="bg1"/>
                           </a:solidFill>
@@ -15932,7 +18615,7 @@
           <a:lstStyle/>
           <a:p>
             <a:r>
-              <a:rPr lang="nl-BE" dirty="0"/>
+              <a:rPr lang="nl-BE" b="1" dirty="0"/>
               <a:t>Mijn onderzoek: </a:t>
             </a:r>
             <a:r>
@@ -16226,20 +18909,24 @@
           <a:lstStyle/>
           <a:p>
             <a:r>
-              <a:rPr lang="en-US" dirty="0" err="1"/>
+              <a:rPr lang="en-US" b="1" dirty="0" err="1"/>
               <a:t>Huidig</a:t>
             </a:r>
             <a:r>
+              <a:rPr lang="en-US" b="1" dirty="0"/>
+              <a:t> </a:t>
+            </a:r>
+            <a:r>
+              <a:rPr lang="en-US" b="1" dirty="0" err="1"/>
+              <a:t>onderzoek</a:t>
+            </a:r>
+            <a:r>
+              <a:rPr lang="en-US" b="1" dirty="0"/>
+              <a:t>: </a:t>
+            </a:r>
+            <a:r>
               <a:rPr lang="en-US" dirty="0"/>
-              <a:t> </a:t>
-            </a:r>
-            <a:r>
-              <a:rPr lang="en-US" dirty="0" err="1"/>
-              <a:t>onderzoek</a:t>
-            </a:r>
-            <a:r>
-              <a:rPr lang="en-US" dirty="0"/>
-              <a:t>: focus op syllable constraint</a:t>
+              <a:t>Focus op syllable constraint</a:t>
             </a:r>
           </a:p>
         </p:txBody>
@@ -16588,20 +19275,24 @@
           <a:lstStyle/>
           <a:p>
             <a:r>
-              <a:rPr lang="en-US" dirty="0" err="1"/>
+              <a:rPr lang="en-US" b="1" dirty="0" err="1"/>
               <a:t>Huidig</a:t>
             </a:r>
             <a:r>
+              <a:rPr lang="en-US" b="1" dirty="0"/>
+              <a:t> </a:t>
+            </a:r>
+            <a:r>
+              <a:rPr lang="en-US" b="1" dirty="0" err="1"/>
+              <a:t>onderzoek</a:t>
+            </a:r>
+            <a:r>
+              <a:rPr lang="en-US" b="1" dirty="0"/>
+              <a:t>: </a:t>
+            </a:r>
+            <a:r>
               <a:rPr lang="en-US" dirty="0"/>
-              <a:t> </a:t>
-            </a:r>
-            <a:r>
-              <a:rPr lang="en-US" dirty="0" err="1"/>
-              <a:t>onderzoek</a:t>
-            </a:r>
-            <a:r>
-              <a:rPr lang="en-US" dirty="0"/>
-              <a:t>: focus op syllable constraint</a:t>
+              <a:t>Focus op syllable constraint</a:t>
             </a:r>
           </a:p>
         </p:txBody>
@@ -16638,10 +19329,165 @@
       </p:grpSpPr>
       <p:sp>
         <p:nvSpPr>
-          <p:cNvPr id="2" name="Tijdelijke aanduiding voor voettekst 1">
+          <p:cNvPr id="2" name="Tijdelijke aanduiding voor inhoud 1">
             <a:extLst>
               <a:ext uri="{FF2B5EF4-FFF2-40B4-BE49-F238E27FC236}">
-                <a16:creationId xmlns:a16="http://schemas.microsoft.com/office/drawing/2014/main" id="{0FF7A986-C092-BFE7-596C-1051E75E8DC4}"/>
+                <a16:creationId xmlns:a16="http://schemas.microsoft.com/office/drawing/2014/main" id="{CF3C8466-5997-42C3-67B7-626B49399CB4}"/>
+              </a:ext>
+            </a:extLst>
+          </p:cNvPr>
+          <p:cNvSpPr>
+            <a:spLocks noGrp="1"/>
+          </p:cNvSpPr>
+          <p:nvPr>
+            <p:ph idx="1"/>
+          </p:nvPr>
+        </p:nvSpPr>
+        <p:spPr/>
+        <p:txBody>
+          <a:bodyPr/>
+          <a:lstStyle/>
+          <a:p>
+            <a:r>
+              <a:rPr lang="nl-NL" dirty="0" err="1"/>
+              <a:t>Transformers</a:t>
+            </a:r>
+            <a:r>
+              <a:rPr lang="nl-NL" dirty="0"/>
+              <a:t> </a:t>
+            </a:r>
+            <a:r>
+              <a:rPr lang="nl-NL" dirty="0" err="1"/>
+              <a:t>library</a:t>
+            </a:r>
+            <a:r>
+              <a:rPr lang="nl-NL" dirty="0"/>
+              <a:t> van </a:t>
+            </a:r>
+            <a:r>
+              <a:rPr lang="nl-NL" dirty="0" err="1"/>
+              <a:t>Hugging</a:t>
+            </a:r>
+            <a:r>
+              <a:rPr lang="nl-NL" dirty="0"/>
+              <a:t> Face (HF)</a:t>
+            </a:r>
+          </a:p>
+          <a:p>
+            <a:pPr lvl="1"/>
+            <a:r>
+              <a:rPr lang="nl-NL" dirty="0"/>
+              <a:t>HF heeft bibliotheek met allerlei open source modellen</a:t>
+            </a:r>
+          </a:p>
+          <a:p>
+            <a:r>
+              <a:rPr lang="nl-NL" dirty="0"/>
+              <a:t>Bevatte al een </a:t>
+            </a:r>
+            <a:r>
+              <a:rPr lang="nl-NL" dirty="0" err="1"/>
+              <a:t>Constraint</a:t>
+            </a:r>
+            <a:r>
+              <a:rPr lang="nl-NL" dirty="0"/>
+              <a:t> class </a:t>
+            </a:r>
+            <a:r>
+              <a:rPr lang="nl-NL" dirty="0">
+                <a:sym typeface="Wingdings" pitchFamily="2" charset="2"/>
+              </a:rPr>
+              <a:t> te weinig flexibiliteit</a:t>
+            </a:r>
+          </a:p>
+          <a:p>
+            <a:r>
+              <a:rPr lang="nl-NL" dirty="0">
+                <a:sym typeface="Wingdings" pitchFamily="2" charset="2"/>
+              </a:rPr>
+              <a:t>Nieuwe </a:t>
+            </a:r>
+            <a:r>
+              <a:rPr lang="nl-NL" dirty="0" err="1">
+                <a:sym typeface="Wingdings" pitchFamily="2" charset="2"/>
+              </a:rPr>
+              <a:t>Constraint</a:t>
+            </a:r>
+            <a:r>
+              <a:rPr lang="nl-NL" dirty="0">
+                <a:sym typeface="Wingdings" pitchFamily="2" charset="2"/>
+              </a:rPr>
+              <a:t> Class gemaakt voor </a:t>
+            </a:r>
+            <a:r>
+              <a:rPr lang="nl-NL" dirty="0" err="1">
+                <a:sym typeface="Wingdings" pitchFamily="2" charset="2"/>
+              </a:rPr>
+              <a:t>beam</a:t>
+            </a:r>
+            <a:r>
+              <a:rPr lang="nl-NL" dirty="0">
+                <a:sym typeface="Wingdings" pitchFamily="2" charset="2"/>
+              </a:rPr>
+              <a:t> search:</a:t>
+            </a:r>
+          </a:p>
+          <a:p>
+            <a:pPr marL="914400" lvl="1" indent="-457200">
+              <a:buFont typeface="+mj-lt"/>
+              <a:buAutoNum type="arabicPeriod"/>
+            </a:pPr>
+            <a:r>
+              <a:rPr lang="nl-NL" dirty="0" err="1">
+                <a:sym typeface="Wingdings" pitchFamily="2" charset="2"/>
+              </a:rPr>
+              <a:t>Logit</a:t>
+            </a:r>
+            <a:r>
+              <a:rPr lang="nl-NL" dirty="0">
+                <a:sym typeface="Wingdings" pitchFamily="2" charset="2"/>
+              </a:rPr>
+              <a:t> score aanpassen</a:t>
+            </a:r>
+          </a:p>
+          <a:p>
+            <a:pPr marL="914400" lvl="1" indent="-457200">
+              <a:buFont typeface="+mj-lt"/>
+              <a:buAutoNum type="arabicPeriod"/>
+            </a:pPr>
+            <a:r>
+              <a:rPr lang="nl-NL" dirty="0"/>
+              <a:t>Beam score aanpassen </a:t>
+            </a:r>
+          </a:p>
+          <a:p>
+            <a:pPr marL="914400" lvl="1" indent="-457200">
+              <a:buFont typeface="+mj-lt"/>
+              <a:buAutoNum type="arabicPeriod"/>
+            </a:pPr>
+            <a:r>
+              <a:rPr lang="nl-NL" dirty="0"/>
+              <a:t>Stop criteria </a:t>
+            </a:r>
+          </a:p>
+          <a:p>
+            <a:pPr marL="914400" lvl="1" indent="-457200">
+              <a:buFont typeface="+mj-lt"/>
+              <a:buAutoNum type="arabicPeriod"/>
+            </a:pPr>
+            <a:endParaRPr lang="nl-NL" dirty="0"/>
+          </a:p>
+          <a:p>
+            <a:endParaRPr lang="nl-NL" dirty="0"/>
+          </a:p>
+        </p:txBody>
+      </p:sp>
+      <p:sp>
+        <p:nvSpPr>
+          <p:cNvPr id="3" name="Tijdelijke aanduiding voor voettekst 2">
+            <a:extLst>
+              <a:ext uri="{FF2B5EF4-FFF2-40B4-BE49-F238E27FC236}">
+                <a16:creationId xmlns:a16="http://schemas.microsoft.com/office/drawing/2014/main" id="{4DD142FA-A8CE-54E6-D309-DAA3BE0F9911}"/>
               </a:ext>
             </a:extLst>
           </p:cNvPr>
@@ -16661,15 +19507,16 @@
               <a:rPr lang="nl-NL"/>
               <a:t>Computerwetenschappen - DTAI</a:t>
             </a:r>
+            <a:endParaRPr lang="nl-NL" dirty="0"/>
           </a:p>
         </p:txBody>
       </p:sp>
       <p:sp>
         <p:nvSpPr>
-          <p:cNvPr id="3" name="Tijdelijke aanduiding voor dianummer 2">
+          <p:cNvPr id="4" name="Tijdelijke aanduiding voor dianummer 3">
             <a:extLst>
               <a:ext uri="{FF2B5EF4-FFF2-40B4-BE49-F238E27FC236}">
-                <a16:creationId xmlns:a16="http://schemas.microsoft.com/office/drawing/2014/main" id="{3AEAB7DB-BFCA-8E16-331A-DFF48B8F272A}"/>
+                <a16:creationId xmlns:a16="http://schemas.microsoft.com/office/drawing/2014/main" id="{12B3B2C7-6A0C-38B5-A78E-FC8F01A91CC6}"/>
               </a:ext>
             </a:extLst>
           </p:cNvPr>
@@ -16689,238 +19536,16 @@
               <a:rPr lang="nl-NL" smtClean="0"/>
               <a:t>9</a:t>
             </a:fld>
-            <a:endParaRPr lang="nl-NL"/>
+            <a:endParaRPr lang="nl-NL" dirty="0"/>
           </a:p>
         </p:txBody>
       </p:sp>
       <p:sp>
         <p:nvSpPr>
-          <p:cNvPr id="4" name="Tijdelijke aanduiding voor inhoud 3">
+          <p:cNvPr id="5" name="Titel 4">
             <a:extLst>
               <a:ext uri="{FF2B5EF4-FFF2-40B4-BE49-F238E27FC236}">
-                <a16:creationId xmlns:a16="http://schemas.microsoft.com/office/drawing/2014/main" id="{261B1904-7BC3-9542-2E79-497F5C35544C}"/>
-              </a:ext>
-            </a:extLst>
-          </p:cNvPr>
-          <p:cNvSpPr>
-            <a:spLocks noGrp="1"/>
-          </p:cNvSpPr>
-          <p:nvPr>
-            <p:ph idx="1"/>
-          </p:nvPr>
-        </p:nvSpPr>
-        <p:spPr/>
-        <p:txBody>
-          <a:bodyPr>
-            <a:normAutofit fontScale="77500" lnSpcReduction="20000"/>
-          </a:bodyPr>
-          <a:lstStyle/>
-          <a:p>
-            <a:r>
-              <a:rPr lang="nl-NL" dirty="0"/>
-              <a:t>November</a:t>
-            </a:r>
-          </a:p>
-          <a:p>
-            <a:pPr lvl="1"/>
-            <a:r>
-              <a:rPr lang="nl-NL" dirty="0"/>
-              <a:t>Eerste implementaties met </a:t>
-            </a:r>
-            <a:r>
-              <a:rPr lang="nl-NL" dirty="0" err="1"/>
-              <a:t>LLM’s</a:t>
-            </a:r>
-            <a:endParaRPr lang="nl-NL" dirty="0"/>
-          </a:p>
-          <a:p>
-            <a:pPr lvl="1"/>
-            <a:r>
-              <a:rPr lang="nl-NL" dirty="0"/>
-              <a:t>WAIY &amp; WAIY+ draaiende krijgen</a:t>
-            </a:r>
-          </a:p>
-          <a:p>
-            <a:pPr lvl="1"/>
-            <a:r>
-              <a:rPr lang="nl-NL" dirty="0"/>
-              <a:t>Datasets maken</a:t>
-            </a:r>
-          </a:p>
-          <a:p>
-            <a:pPr lvl="1"/>
-            <a:r>
-              <a:rPr lang="nl-NL" dirty="0"/>
-              <a:t>Vertrouwd raken met software</a:t>
-            </a:r>
-          </a:p>
-          <a:p>
-            <a:pPr lvl="1"/>
-            <a:r>
-              <a:rPr lang="nl-NL" dirty="0"/>
-              <a:t>Groot deel van Literatuur studie geschreven hebben</a:t>
-            </a:r>
-          </a:p>
-          <a:p>
-            <a:r>
-              <a:rPr lang="nl-NL" dirty="0"/>
-              <a:t>December</a:t>
-            </a:r>
-          </a:p>
-          <a:p>
-            <a:pPr lvl="1"/>
-            <a:r>
-              <a:rPr lang="nl-NL" dirty="0"/>
-              <a:t>Onderzoek verschillende </a:t>
-            </a:r>
-            <a:r>
-              <a:rPr lang="nl-NL" dirty="0" err="1"/>
-              <a:t>constraints</a:t>
-            </a:r>
-            <a:r>
-              <a:rPr lang="nl-NL" dirty="0"/>
-              <a:t> proberen toe te passen</a:t>
-            </a:r>
-          </a:p>
-          <a:p>
-            <a:pPr lvl="1"/>
-            <a:r>
-              <a:rPr lang="nl-NL" dirty="0"/>
-              <a:t>Prototype bouwen</a:t>
-            </a:r>
-          </a:p>
-          <a:p>
-            <a:pPr lvl="1"/>
-            <a:r>
-              <a:rPr lang="nl-NL" dirty="0"/>
-              <a:t>Onderzoek naar beste </a:t>
-            </a:r>
-            <a:r>
-              <a:rPr lang="nl-NL" dirty="0" err="1"/>
-              <a:t>metrics</a:t>
-            </a:r>
-            <a:r>
-              <a:rPr lang="nl-NL" dirty="0"/>
-              <a:t> </a:t>
-            </a:r>
-          </a:p>
-          <a:p>
-            <a:r>
-              <a:rPr lang="nl-NL" dirty="0"/>
-              <a:t>Januari</a:t>
-            </a:r>
-          </a:p>
-          <a:p>
-            <a:pPr lvl="1"/>
-            <a:r>
-              <a:rPr lang="nl-NL" dirty="0"/>
-              <a:t>Evalueren van initiële modellen</a:t>
-            </a:r>
-          </a:p>
-          <a:p>
-            <a:pPr lvl="1"/>
-            <a:r>
-              <a:rPr lang="nl-NL" dirty="0"/>
-              <a:t>Nieuwe modellen maken en trainen</a:t>
-            </a:r>
-          </a:p>
-          <a:p>
-            <a:pPr lvl="1"/>
-            <a:endParaRPr lang="nl-NL" dirty="0"/>
-          </a:p>
-          <a:p>
-            <a:pPr lvl="1"/>
-            <a:endParaRPr lang="nl-NL" dirty="0"/>
-          </a:p>
-        </p:txBody>
-      </p:sp>
-      <p:sp>
-        <p:nvSpPr>
-          <p:cNvPr id="5" name="Tijdelijke aanduiding voor inhoud 4">
-            <a:extLst>
-              <a:ext uri="{FF2B5EF4-FFF2-40B4-BE49-F238E27FC236}">
-                <a16:creationId xmlns:a16="http://schemas.microsoft.com/office/drawing/2014/main" id="{3A3EA626-5665-AB09-A59C-C86A0175DEDC}"/>
-              </a:ext>
-            </a:extLst>
-          </p:cNvPr>
-          <p:cNvSpPr>
-            <a:spLocks noGrp="1"/>
-          </p:cNvSpPr>
-          <p:nvPr>
-            <p:ph sz="quarter" idx="13"/>
-          </p:nvPr>
-        </p:nvSpPr>
-        <p:spPr/>
-        <p:txBody>
-          <a:bodyPr>
-            <a:normAutofit/>
-          </a:bodyPr>
-          <a:lstStyle/>
-          <a:p>
-            <a:r>
-              <a:rPr lang="nl-NL" sz="1900" dirty="0"/>
-              <a:t>Februari</a:t>
-            </a:r>
-          </a:p>
-          <a:p>
-            <a:pPr lvl="1"/>
-            <a:r>
-              <a:rPr lang="nl-NL" sz="1900" dirty="0"/>
-              <a:t>Fine tune van beste modellen</a:t>
-            </a:r>
-          </a:p>
-          <a:p>
-            <a:pPr lvl="1"/>
-            <a:r>
-              <a:rPr lang="nl-NL" sz="1900" dirty="0"/>
-              <a:t>Survey van verschillende modellen voor bereiden</a:t>
-            </a:r>
-          </a:p>
-          <a:p>
-            <a:r>
-              <a:rPr lang="nl-NL" sz="1900" dirty="0"/>
-              <a:t>Maart</a:t>
-            </a:r>
-          </a:p>
-          <a:p>
-            <a:pPr lvl="1"/>
-            <a:r>
-              <a:rPr lang="nl-NL" sz="1900" dirty="0"/>
-              <a:t>Survey lanceren</a:t>
-            </a:r>
-          </a:p>
-          <a:p>
-            <a:pPr lvl="1"/>
-            <a:r>
-              <a:rPr lang="nl-NL" sz="1900" dirty="0"/>
-              <a:t>Een stream line algoritme met interface te maken</a:t>
-            </a:r>
-          </a:p>
-          <a:p>
-            <a:r>
-              <a:rPr lang="nl-NL" sz="1900" dirty="0"/>
-              <a:t>April &amp; Mei</a:t>
-            </a:r>
-          </a:p>
-          <a:p>
-            <a:pPr lvl="1"/>
-            <a:r>
-              <a:rPr lang="nl-NL" sz="1900" dirty="0"/>
-              <a:t>Full focus op het schrijven van de thesis</a:t>
-            </a:r>
-          </a:p>
-          <a:p>
-            <a:pPr lvl="1"/>
-            <a:endParaRPr lang="nl-NL" sz="1900" dirty="0"/>
-          </a:p>
-        </p:txBody>
-      </p:sp>
-      <p:sp>
-        <p:nvSpPr>
-          <p:cNvPr id="6" name="Titel 5">
-            <a:extLst>
-              <a:ext uri="{FF2B5EF4-FFF2-40B4-BE49-F238E27FC236}">
-                <a16:creationId xmlns:a16="http://schemas.microsoft.com/office/drawing/2014/main" id="{6C21229E-8101-C29D-AE9D-A0A36B5EAEF8}"/>
+                <a16:creationId xmlns:a16="http://schemas.microsoft.com/office/drawing/2014/main" id="{0A42AF39-926A-F91A-357F-EE43AF4D40BF}"/>
               </a:ext>
             </a:extLst>
           </p:cNvPr>
@@ -16937,16 +19562,85 @@
           <a:lstStyle/>
           <a:p>
             <a:r>
+              <a:rPr lang="nl-NL" b="1" dirty="0"/>
+              <a:t>Huidig onderzoek: </a:t>
+            </a:r>
+            <a:r>
               <a:rPr lang="nl-NL" dirty="0"/>
-              <a:t>Planning</a:t>
-            </a:r>
+              <a:t>Toevoegen van </a:t>
+            </a:r>
+            <a:r>
+              <a:rPr lang="nl-NL" dirty="0" err="1"/>
+              <a:t>Constraints</a:t>
+            </a:r>
+            <a:endParaRPr lang="nl-NL" dirty="0"/>
           </a:p>
         </p:txBody>
       </p:sp>
+      <p:pic>
+        <p:nvPicPr>
+          <p:cNvPr id="7" name="Afbeelding 6">
+            <a:extLst>
+              <a:ext uri="{FF2B5EF4-FFF2-40B4-BE49-F238E27FC236}">
+                <a16:creationId xmlns:a16="http://schemas.microsoft.com/office/drawing/2014/main" id="{C576BD52-F709-ADE8-2AF5-CC21D2BD4C12}"/>
+              </a:ext>
+            </a:extLst>
+          </p:cNvPr>
+          <p:cNvPicPr>
+            <a:picLocks noChangeAspect="1"/>
+          </p:cNvPicPr>
+          <p:nvPr/>
+        </p:nvPicPr>
+        <p:blipFill>
+          <a:blip r:embed="rId2"/>
+          <a:stretch>
+            <a:fillRect/>
+          </a:stretch>
+        </p:blipFill>
+        <p:spPr>
+          <a:xfrm>
+            <a:off x="9574695" y="1359036"/>
+            <a:ext cx="1818860" cy="1818860"/>
+          </a:xfrm>
+          <a:prstGeom prst="rect">
+            <a:avLst/>
+          </a:prstGeom>
+        </p:spPr>
+      </p:pic>
+      <p:pic>
+        <p:nvPicPr>
+          <p:cNvPr id="9" name="Afbeelding 8">
+            <a:extLst>
+              <a:ext uri="{FF2B5EF4-FFF2-40B4-BE49-F238E27FC236}">
+                <a16:creationId xmlns:a16="http://schemas.microsoft.com/office/drawing/2014/main" id="{DE55566C-9B0F-43E5-9A14-A8FAF0801149}"/>
+              </a:ext>
+            </a:extLst>
+          </p:cNvPr>
+          <p:cNvPicPr>
+            <a:picLocks noChangeAspect="1"/>
+          </p:cNvPicPr>
+          <p:nvPr/>
+        </p:nvPicPr>
+        <p:blipFill>
+          <a:blip r:embed="rId3"/>
+          <a:stretch>
+            <a:fillRect/>
+          </a:stretch>
+        </p:blipFill>
+        <p:spPr>
+          <a:xfrm>
+            <a:off x="6096000" y="3429000"/>
+            <a:ext cx="3309666" cy="2472994"/>
+          </a:xfrm>
+          <a:prstGeom prst="rect">
+            <a:avLst/>
+          </a:prstGeom>
+        </p:spPr>
+      </p:pic>
     </p:spTree>
     <p:extLst>
       <p:ext uri="{BB962C8B-B14F-4D97-AF65-F5344CB8AC3E}">
-        <p14:creationId xmlns:p14="http://schemas.microsoft.com/office/powerpoint/2010/main" val="1808906806"/>
+        <p14:creationId xmlns:p14="http://schemas.microsoft.com/office/powerpoint/2010/main" val="1014333410"/>
       </p:ext>
     </p:extLst>
   </p:cSld>

</xml_diff>